<commit_message>
split Westeros excel import tutorial into two parts
</commit_message>
<xml_diff>
--- a/tutorial/westeros/_static/westeroes_baseline_xlsx_workflow.pptx
+++ b/tutorial/westeros/_static/westeroes_baseline_xlsx_workflow.pptx
@@ -6,13 +6,14 @@
     <p:sldMasterId id="2147483677" r:id="rId5"/>
   </p:sldMasterIdLst>
   <p:notesMasterIdLst>
-    <p:notesMasterId r:id="rId7"/>
+    <p:notesMasterId r:id="rId8"/>
   </p:notesMasterIdLst>
   <p:handoutMasterIdLst>
-    <p:handoutMasterId r:id="rId8"/>
+    <p:handoutMasterId r:id="rId9"/>
   </p:handoutMasterIdLst>
   <p:sldIdLst>
     <p:sldId id="268" r:id="rId6"/>
+    <p:sldId id="269" r:id="rId7"/>
   </p:sldIdLst>
   <p:sldSz cx="12192000" cy="6858000"/>
   <p:notesSz cx="6797675" cy="9926638"/>
@@ -120,6 +121,7 @@
         <p14:section name="Untitled Section" id="{B0E2A3F2-3051-4578-9CF2-FAC07A1286BD}">
           <p14:sldIdLst>
             <p14:sldId id="268"/>
+            <p14:sldId id="269"/>
           </p14:sldIdLst>
         </p14:section>
       </p14:sectionLst>
@@ -364,7 +366,7 @@
           <a:p>
             <a:fld id="{1EAC332E-8893-FE4E-9A25-93BB30EFA0DA}" type="datetimeFigureOut">
               <a:rPr lang="en-US" smtClean="0"/>
-              <a:t>3/22/2021</a:t>
+              <a:t>4/21/2021</a:t>
             </a:fld>
             <a:endParaRPr lang="en-US"/>
           </a:p>
@@ -629,6 +631,180 @@
     </a:lvl9pPr>
   </p:notesStyle>
 </p:notesMaster>
+</file>
+
+<file path=ppt/notesSlides/notesSlide1.xml><?xml version="1.0" encoding="utf-8"?>
+<p:notes xmlns:a="http://schemas.openxmlformats.org/drawingml/2006/main" xmlns:r="http://schemas.openxmlformats.org/officeDocument/2006/relationships" xmlns:p="http://schemas.openxmlformats.org/presentationml/2006/main">
+  <p:cSld>
+    <p:spTree>
+      <p:nvGrpSpPr>
+        <p:cNvPr id="1" name=""/>
+        <p:cNvGrpSpPr/>
+        <p:nvPr/>
+      </p:nvGrpSpPr>
+      <p:grpSpPr>
+        <a:xfrm>
+          <a:off x="0" y="0"/>
+          <a:ext cx="0" cy="0"/>
+          <a:chOff x="0" y="0"/>
+          <a:chExt cx="0" cy="0"/>
+        </a:xfrm>
+      </p:grpSpPr>
+      <p:sp>
+        <p:nvSpPr>
+          <p:cNvPr id="2" name="Slide Image Placeholder 1"/>
+          <p:cNvSpPr>
+            <a:spLocks noGrp="1" noRot="1" noChangeAspect="1"/>
+          </p:cNvSpPr>
+          <p:nvPr>
+            <p:ph type="sldImg"/>
+          </p:nvPr>
+        </p:nvSpPr>
+        <p:spPr/>
+      </p:sp>
+      <p:sp>
+        <p:nvSpPr>
+          <p:cNvPr id="3" name="Notes Placeholder 2"/>
+          <p:cNvSpPr>
+            <a:spLocks noGrp="1"/>
+          </p:cNvSpPr>
+          <p:nvPr>
+            <p:ph type="body" idx="1"/>
+          </p:nvPr>
+        </p:nvSpPr>
+        <p:spPr/>
+        <p:txBody>
+          <a:bodyPr/>
+          <a:lstStyle/>
+          <a:p>
+            <a:r>
+              <a:rPr lang="en-US" dirty="0"/>
+              <a:t>Save files as (westeroes_baseline_xlsx_workflow_part1.jpg)</a:t>
+            </a:r>
+          </a:p>
+        </p:txBody>
+      </p:sp>
+      <p:sp>
+        <p:nvSpPr>
+          <p:cNvPr id="4" name="Slide Number Placeholder 3"/>
+          <p:cNvSpPr>
+            <a:spLocks noGrp="1"/>
+          </p:cNvSpPr>
+          <p:nvPr>
+            <p:ph type="sldNum" sz="quarter" idx="5"/>
+          </p:nvPr>
+        </p:nvSpPr>
+        <p:spPr/>
+        <p:txBody>
+          <a:bodyPr/>
+          <a:lstStyle/>
+          <a:p>
+            <a:fld id="{0B17A1DD-B70C-B048-99CA-ED854228726D}" type="slidenum">
+              <a:rPr lang="en-US" smtClean="0"/>
+              <a:t>1</a:t>
+            </a:fld>
+            <a:endParaRPr lang="en-US"/>
+          </a:p>
+        </p:txBody>
+      </p:sp>
+    </p:spTree>
+    <p:extLst>
+      <p:ext uri="{BB962C8B-B14F-4D97-AF65-F5344CB8AC3E}">
+        <p14:creationId xmlns:p14="http://schemas.microsoft.com/office/powerpoint/2010/main" val="859476277"/>
+      </p:ext>
+    </p:extLst>
+  </p:cSld>
+  <p:clrMapOvr>
+    <a:masterClrMapping/>
+  </p:clrMapOvr>
+</p:notes>
+</file>
+
+<file path=ppt/notesSlides/notesSlide2.xml><?xml version="1.0" encoding="utf-8"?>
+<p:notes xmlns:a="http://schemas.openxmlformats.org/drawingml/2006/main" xmlns:r="http://schemas.openxmlformats.org/officeDocument/2006/relationships" xmlns:p="http://schemas.openxmlformats.org/presentationml/2006/main">
+  <p:cSld>
+    <p:spTree>
+      <p:nvGrpSpPr>
+        <p:cNvPr id="1" name=""/>
+        <p:cNvGrpSpPr/>
+        <p:nvPr/>
+      </p:nvGrpSpPr>
+      <p:grpSpPr>
+        <a:xfrm>
+          <a:off x="0" y="0"/>
+          <a:ext cx="0" cy="0"/>
+          <a:chOff x="0" y="0"/>
+          <a:chExt cx="0" cy="0"/>
+        </a:xfrm>
+      </p:grpSpPr>
+      <p:sp>
+        <p:nvSpPr>
+          <p:cNvPr id="2" name="Slide Image Placeholder 1"/>
+          <p:cNvSpPr>
+            <a:spLocks noGrp="1" noRot="1" noChangeAspect="1"/>
+          </p:cNvSpPr>
+          <p:nvPr>
+            <p:ph type="sldImg"/>
+          </p:nvPr>
+        </p:nvSpPr>
+        <p:spPr/>
+      </p:sp>
+      <p:sp>
+        <p:nvSpPr>
+          <p:cNvPr id="3" name="Notes Placeholder 2"/>
+          <p:cNvSpPr>
+            <a:spLocks noGrp="1"/>
+          </p:cNvSpPr>
+          <p:nvPr>
+            <p:ph type="body" idx="1"/>
+          </p:nvPr>
+        </p:nvSpPr>
+        <p:spPr/>
+        <p:txBody>
+          <a:bodyPr/>
+          <a:lstStyle/>
+          <a:p>
+            <a:r>
+              <a:rPr lang="en-US" dirty="0"/>
+              <a:t>Save files as (westeroes_baseline_xlsx_workflow_part2.jpg)</a:t>
+            </a:r>
+          </a:p>
+        </p:txBody>
+      </p:sp>
+      <p:sp>
+        <p:nvSpPr>
+          <p:cNvPr id="4" name="Slide Number Placeholder 3"/>
+          <p:cNvSpPr>
+            <a:spLocks noGrp="1"/>
+          </p:cNvSpPr>
+          <p:nvPr>
+            <p:ph type="sldNum" sz="quarter" idx="5"/>
+          </p:nvPr>
+        </p:nvSpPr>
+        <p:spPr/>
+        <p:txBody>
+          <a:bodyPr/>
+          <a:lstStyle/>
+          <a:p>
+            <a:fld id="{0B17A1DD-B70C-B048-99CA-ED854228726D}" type="slidenum">
+              <a:rPr lang="en-US" smtClean="0"/>
+              <a:t>2</a:t>
+            </a:fld>
+            <a:endParaRPr lang="en-US"/>
+          </a:p>
+        </p:txBody>
+      </p:sp>
+    </p:spTree>
+    <p:extLst>
+      <p:ext uri="{BB962C8B-B14F-4D97-AF65-F5344CB8AC3E}">
+        <p14:creationId xmlns:p14="http://schemas.microsoft.com/office/powerpoint/2010/main" val="803201506"/>
+      </p:ext>
+    </p:extLst>
+  </p:cSld>
+  <p:clrMapOvr>
+    <a:masterClrMapping/>
+  </p:clrMapOvr>
+</p:notes>
 </file>
 
 <file path=ppt/slideLayouts/slideLayout1.xml><?xml version="1.0" encoding="utf-8"?>
@@ -2269,7 +2445,7 @@
           <a:p>
             <a:fld id="{6CCCF253-1AAC-4E48-AEC6-9F6937C7D46B}" type="datetime4">
               <a:rPr lang="LID4096" noProof="0" smtClean="0"/>
-              <a:t>22 March 2021</a:t>
+              <a:t>21 April 2021</a:t>
             </a:fld>
             <a:endParaRPr lang="en-GB" noProof="0"/>
           </a:p>
@@ -2658,7 +2834,7 @@
           <a:p>
             <a:fld id="{D70C37C2-A143-402B-877C-849CBEEFD25A}" type="datetime4">
               <a:rPr lang="LID4096" smtClean="0"/>
-              <a:t>22 March 2021</a:t>
+              <a:t>21 April 2021</a:t>
             </a:fld>
             <a:endParaRPr lang="en-GB"/>
           </a:p>
@@ -3129,7 +3305,7 @@
           <a:p>
             <a:fld id="{544AD98C-C026-43BB-AEEE-3945BA0F5F8C}" type="datetime4">
               <a:rPr lang="LID4096" noProof="0" smtClean="0"/>
-              <a:t>22 March 2021</a:t>
+              <a:t>21 April 2021</a:t>
             </a:fld>
             <a:endParaRPr lang="en-GB" noProof="0"/>
           </a:p>
@@ -3480,7 +3656,7 @@
           <a:p>
             <a:fld id="{E782D6B4-2390-4BCC-B671-8CF648CB235D}" type="datetime4">
               <a:rPr lang="LID4096" noProof="0" smtClean="0"/>
-              <a:t>22 March 2021</a:t>
+              <a:t>21 April 2021</a:t>
             </a:fld>
             <a:endParaRPr lang="en-GB" noProof="0"/>
           </a:p>
@@ -3940,7 +4116,7 @@
           <a:p>
             <a:fld id="{23412D64-AA80-4167-B477-6ED1D7FC4795}" type="datetime4">
               <a:rPr lang="LID4096" smtClean="0"/>
-              <a:t>22 March 2021</a:t>
+              <a:t>21 April 2021</a:t>
             </a:fld>
             <a:endParaRPr lang="en-GB"/>
           </a:p>
@@ -4361,7 +4537,7 @@
           <a:p>
             <a:fld id="{CA025497-7E11-4525-9692-4120F835BBD2}" type="datetime4">
               <a:rPr lang="LID4096" smtClean="0"/>
-              <a:t>22 March 2021</a:t>
+              <a:t>21 April 2021</a:t>
             </a:fld>
             <a:endParaRPr lang="en-GB"/>
           </a:p>
@@ -4986,7 +5162,7 @@
           <a:p>
             <a:fld id="{29920D7F-2E71-4F3D-9F44-90C68F6B8EA4}" type="datetime4">
               <a:rPr lang="LID4096" smtClean="0"/>
-              <a:t>22 March 2021</a:t>
+              <a:t>21 April 2021</a:t>
             </a:fld>
             <a:endParaRPr lang="en-GB"/>
           </a:p>
@@ -7890,6 +8066,2500 @@
       </p:sp>
       <p:sp>
         <p:nvSpPr>
+          <p:cNvPr id="70" name="Arrow: Down 69">
+            <a:extLst>
+              <a:ext uri="{FF2B5EF4-FFF2-40B4-BE49-F238E27FC236}">
+                <a16:creationId xmlns:a16="http://schemas.microsoft.com/office/drawing/2014/main" id="{4647B160-8544-4A31-AE6B-50182E70D190}"/>
+              </a:ext>
+            </a:extLst>
+          </p:cNvPr>
+          <p:cNvSpPr/>
+          <p:nvPr/>
+        </p:nvSpPr>
+        <p:spPr>
+          <a:xfrm>
+            <a:off x="8864302" y="3733726"/>
+            <a:ext cx="426720" cy="1098385"/>
+          </a:xfrm>
+          <a:prstGeom prst="downArrow">
+            <a:avLst/>
+          </a:prstGeom>
+          <a:solidFill>
+            <a:schemeClr val="bg1"/>
+          </a:solidFill>
+        </p:spPr>
+        <p:style>
+          <a:lnRef idx="2">
+            <a:schemeClr val="accent1">
+              <a:shade val="50000"/>
+            </a:schemeClr>
+          </a:lnRef>
+          <a:fillRef idx="1">
+            <a:schemeClr val="accent1"/>
+          </a:fillRef>
+          <a:effectRef idx="0">
+            <a:schemeClr val="accent1"/>
+          </a:effectRef>
+          <a:fontRef idx="minor">
+            <a:schemeClr val="lt1"/>
+          </a:fontRef>
+        </p:style>
+        <p:txBody>
+          <a:bodyPr rtlCol="0" anchor="ctr"/>
+          <a:lstStyle/>
+          <a:p>
+            <a:pPr algn="ctr"/>
+            <a:endParaRPr lang="en-US"/>
+          </a:p>
+        </p:txBody>
+      </p:sp>
+      <p:sp>
+        <p:nvSpPr>
+          <p:cNvPr id="71" name="Rectangle 70">
+            <a:extLst>
+              <a:ext uri="{FF2B5EF4-FFF2-40B4-BE49-F238E27FC236}">
+                <a16:creationId xmlns:a16="http://schemas.microsoft.com/office/drawing/2014/main" id="{D5452337-8AD9-4239-B5B2-CEB3A5A2D209}"/>
+              </a:ext>
+            </a:extLst>
+          </p:cNvPr>
+          <p:cNvSpPr/>
+          <p:nvPr/>
+        </p:nvSpPr>
+        <p:spPr>
+          <a:xfrm>
+            <a:off x="6248897" y="3060918"/>
+            <a:ext cx="5693807" cy="780493"/>
+          </a:xfrm>
+          <a:prstGeom prst="rect">
+            <a:avLst/>
+          </a:prstGeom>
+          <a:solidFill>
+            <a:schemeClr val="accent4">
+              <a:lumMod val="40000"/>
+              <a:lumOff val="60000"/>
+            </a:schemeClr>
+          </a:solidFill>
+          <a:effectLst>
+            <a:outerShdw blurRad="50800" dist="38100" dir="2700000" algn="tl" rotWithShape="0">
+              <a:prstClr val="black">
+                <a:alpha val="40000"/>
+              </a:prstClr>
+            </a:outerShdw>
+          </a:effectLst>
+        </p:spPr>
+        <p:style>
+          <a:lnRef idx="2">
+            <a:schemeClr val="accent1">
+              <a:shade val="50000"/>
+            </a:schemeClr>
+          </a:lnRef>
+          <a:fillRef idx="1">
+            <a:schemeClr val="accent1"/>
+          </a:fillRef>
+          <a:effectRef idx="0">
+            <a:schemeClr val="accent1"/>
+          </a:effectRef>
+          <a:fontRef idx="minor">
+            <a:schemeClr val="lt1"/>
+          </a:fontRef>
+        </p:style>
+        <p:txBody>
+          <a:bodyPr rtlCol="0" anchor="ctr"/>
+          <a:lstStyle/>
+          <a:p>
+            <a:pPr algn="ctr"/>
+            <a:r>
+              <a:rPr lang="en-US" dirty="0">
+                <a:solidFill>
+                  <a:sysClr val="windowText" lastClr="000000"/>
+                </a:solidFill>
+              </a:rPr>
+              <a:t>script (</a:t>
+            </a:r>
+            <a:r>
+              <a:rPr lang="en-US" i="1" dirty="0">
+                <a:solidFill>
+                  <a:sysClr val="windowText" lastClr="000000"/>
+                </a:solidFill>
+              </a:rPr>
+              <a:t>python, R, </a:t>
+            </a:r>
+            <a:r>
+              <a:rPr lang="en-US" i="1" dirty="0" err="1">
+                <a:solidFill>
+                  <a:sysClr val="windowText" lastClr="000000"/>
+                </a:solidFill>
+              </a:rPr>
+              <a:t>jupyter</a:t>
+            </a:r>
+            <a:r>
+              <a:rPr lang="en-US" i="1" dirty="0">
+                <a:solidFill>
+                  <a:sysClr val="windowText" lastClr="000000"/>
+                </a:solidFill>
+              </a:rPr>
+              <a:t> notebook)</a:t>
+            </a:r>
+          </a:p>
+        </p:txBody>
+      </p:sp>
+      <p:sp>
+        <p:nvSpPr>
+          <p:cNvPr id="72" name="Arrow: Down 71">
+            <a:extLst>
+              <a:ext uri="{FF2B5EF4-FFF2-40B4-BE49-F238E27FC236}">
+                <a16:creationId xmlns:a16="http://schemas.microsoft.com/office/drawing/2014/main" id="{F51321BA-CD27-4899-8373-C256828F1924}"/>
+              </a:ext>
+            </a:extLst>
+          </p:cNvPr>
+          <p:cNvSpPr/>
+          <p:nvPr/>
+        </p:nvSpPr>
+        <p:spPr>
+          <a:xfrm>
+            <a:off x="8878884" y="2245029"/>
+            <a:ext cx="426720" cy="874979"/>
+          </a:xfrm>
+          <a:prstGeom prst="downArrow">
+            <a:avLst/>
+          </a:prstGeom>
+          <a:solidFill>
+            <a:schemeClr val="bg1"/>
+          </a:solidFill>
+        </p:spPr>
+        <p:style>
+          <a:lnRef idx="2">
+            <a:schemeClr val="accent1">
+              <a:shade val="50000"/>
+            </a:schemeClr>
+          </a:lnRef>
+          <a:fillRef idx="1">
+            <a:schemeClr val="accent1"/>
+          </a:fillRef>
+          <a:effectRef idx="0">
+            <a:schemeClr val="accent1"/>
+          </a:effectRef>
+          <a:fontRef idx="minor">
+            <a:schemeClr val="lt1"/>
+          </a:fontRef>
+        </p:style>
+        <p:txBody>
+          <a:bodyPr rtlCol="0" anchor="ctr"/>
+          <a:lstStyle/>
+          <a:p>
+            <a:pPr algn="ctr"/>
+            <a:endParaRPr lang="en-US"/>
+          </a:p>
+        </p:txBody>
+      </p:sp>
+      <p:sp>
+        <p:nvSpPr>
+          <p:cNvPr id="79" name="Rectangle 78">
+            <a:extLst>
+              <a:ext uri="{FF2B5EF4-FFF2-40B4-BE49-F238E27FC236}">
+                <a16:creationId xmlns:a16="http://schemas.microsoft.com/office/drawing/2014/main" id="{8E15F35D-94E0-4F8A-AE6A-A49AFFEB2901}"/>
+              </a:ext>
+            </a:extLst>
+          </p:cNvPr>
+          <p:cNvSpPr/>
+          <p:nvPr/>
+        </p:nvSpPr>
+        <p:spPr>
+          <a:xfrm>
+            <a:off x="6248897" y="1770599"/>
+            <a:ext cx="5686695" cy="545494"/>
+          </a:xfrm>
+          <a:prstGeom prst="rect">
+            <a:avLst/>
+          </a:prstGeom>
+          <a:solidFill>
+            <a:schemeClr val="accent2"/>
+          </a:solidFill>
+          <a:effectLst>
+            <a:outerShdw blurRad="50800" dist="38100" dir="2700000" algn="tl" rotWithShape="0">
+              <a:prstClr val="black">
+                <a:alpha val="40000"/>
+              </a:prstClr>
+            </a:outerShdw>
+          </a:effectLst>
+        </p:spPr>
+        <p:style>
+          <a:lnRef idx="2">
+            <a:schemeClr val="accent1">
+              <a:shade val="50000"/>
+            </a:schemeClr>
+          </a:lnRef>
+          <a:fillRef idx="1">
+            <a:schemeClr val="accent1"/>
+          </a:fillRef>
+          <a:effectRef idx="0">
+            <a:schemeClr val="accent1"/>
+          </a:effectRef>
+          <a:fontRef idx="minor">
+            <a:schemeClr val="lt1"/>
+          </a:fontRef>
+        </p:style>
+        <p:txBody>
+          <a:bodyPr rtlCol="0" anchor="ctr"/>
+          <a:lstStyle/>
+          <a:p>
+            <a:pPr algn="ctr"/>
+            <a:r>
+              <a:rPr lang="en-US" dirty="0"/>
+              <a:t>Data set in “.xlsx” format</a:t>
+            </a:r>
+          </a:p>
+        </p:txBody>
+      </p:sp>
+    </p:spTree>
+    <p:extLst>
+      <p:ext uri="{BB962C8B-B14F-4D97-AF65-F5344CB8AC3E}">
+        <p14:creationId xmlns:p14="http://schemas.microsoft.com/office/powerpoint/2010/main" val="2825312319"/>
+      </p:ext>
+    </p:extLst>
+  </p:cSld>
+  <p:clrMapOvr>
+    <a:masterClrMapping/>
+  </p:clrMapOvr>
+</p:sld>
+</file>
+
+<file path=ppt/slides/slide2.xml><?xml version="1.0" encoding="utf-8"?>
+<p:sld xmlns:a="http://schemas.openxmlformats.org/drawingml/2006/main" xmlns:r="http://schemas.openxmlformats.org/officeDocument/2006/relationships" xmlns:p="http://schemas.openxmlformats.org/presentationml/2006/main">
+  <p:cSld>
+    <p:bg>
+      <p:bgPr>
+        <a:solidFill>
+          <a:schemeClr val="bg1"/>
+        </a:solidFill>
+        <a:effectLst/>
+      </p:bgPr>
+    </p:bg>
+    <p:spTree>
+      <p:nvGrpSpPr>
+        <p:cNvPr id="1" name=""/>
+        <p:cNvGrpSpPr/>
+        <p:nvPr/>
+      </p:nvGrpSpPr>
+      <p:grpSpPr>
+        <a:xfrm>
+          <a:off x="0" y="0"/>
+          <a:ext cx="0" cy="0"/>
+          <a:chOff x="0" y="0"/>
+          <a:chExt cx="0" cy="0"/>
+        </a:xfrm>
+      </p:grpSpPr>
+      <p:sp>
+        <p:nvSpPr>
+          <p:cNvPr id="33" name="Rectangle: Rounded Corners 32">
+            <a:extLst>
+              <a:ext uri="{FF2B5EF4-FFF2-40B4-BE49-F238E27FC236}">
+                <a16:creationId xmlns:a16="http://schemas.microsoft.com/office/drawing/2014/main" id="{56B5C6BD-B3CD-489F-A105-7DF2B333516D}"/>
+              </a:ext>
+            </a:extLst>
+          </p:cNvPr>
+          <p:cNvSpPr/>
+          <p:nvPr/>
+        </p:nvSpPr>
+        <p:spPr>
+          <a:xfrm>
+            <a:off x="17114" y="16622"/>
+            <a:ext cx="6022146" cy="6797440"/>
+          </a:xfrm>
+          <a:prstGeom prst="roundRect">
+            <a:avLst>
+              <a:gd name="adj" fmla="val 1142"/>
+            </a:avLst>
+          </a:prstGeom>
+        </p:spPr>
+        <p:style>
+          <a:lnRef idx="2">
+            <a:schemeClr val="accent1">
+              <a:shade val="50000"/>
+            </a:schemeClr>
+          </a:lnRef>
+          <a:fillRef idx="1">
+            <a:schemeClr val="accent1"/>
+          </a:fillRef>
+          <a:effectRef idx="0">
+            <a:schemeClr val="accent1"/>
+          </a:effectRef>
+          <a:fontRef idx="minor">
+            <a:schemeClr val="lt1"/>
+          </a:fontRef>
+        </p:style>
+        <p:txBody>
+          <a:bodyPr rtlCol="0" anchor="ctr"/>
+          <a:lstStyle/>
+          <a:p>
+            <a:pPr algn="ctr"/>
+            <a:endParaRPr lang="en-US"/>
+          </a:p>
+        </p:txBody>
+      </p:sp>
+      <p:sp>
+        <p:nvSpPr>
+          <p:cNvPr id="47" name="Rectangle 46">
+            <a:extLst>
+              <a:ext uri="{FF2B5EF4-FFF2-40B4-BE49-F238E27FC236}">
+                <a16:creationId xmlns:a16="http://schemas.microsoft.com/office/drawing/2014/main" id="{A3D4275F-7864-4C65-A161-95A96CAAE8A1}"/>
+              </a:ext>
+            </a:extLst>
+          </p:cNvPr>
+          <p:cNvSpPr/>
+          <p:nvPr/>
+        </p:nvSpPr>
+        <p:spPr>
+          <a:xfrm>
+            <a:off x="173142" y="4758147"/>
+            <a:ext cx="5693807" cy="1888500"/>
+          </a:xfrm>
+          <a:prstGeom prst="rect">
+            <a:avLst/>
+          </a:prstGeom>
+          <a:solidFill>
+            <a:schemeClr val="accent2">
+              <a:lumMod val="40000"/>
+              <a:lumOff val="60000"/>
+            </a:schemeClr>
+          </a:solidFill>
+          <a:effectLst>
+            <a:outerShdw blurRad="50800" dist="38100" dir="2700000" algn="tl" rotWithShape="0">
+              <a:prstClr val="black">
+                <a:alpha val="40000"/>
+              </a:prstClr>
+            </a:outerShdw>
+          </a:effectLst>
+        </p:spPr>
+        <p:style>
+          <a:lnRef idx="2">
+            <a:schemeClr val="accent1">
+              <a:shade val="50000"/>
+            </a:schemeClr>
+          </a:lnRef>
+          <a:fillRef idx="1">
+            <a:schemeClr val="accent1"/>
+          </a:fillRef>
+          <a:effectRef idx="0">
+            <a:schemeClr val="accent1"/>
+          </a:effectRef>
+          <a:fontRef idx="minor">
+            <a:schemeClr val="lt1"/>
+          </a:fontRef>
+        </p:style>
+        <p:txBody>
+          <a:bodyPr rtlCol="0" anchor="ctr"/>
+          <a:lstStyle/>
+          <a:p>
+            <a:pPr algn="ctr"/>
+            <a:r>
+              <a:rPr lang="en-US" dirty="0" err="1">
+                <a:solidFill>
+                  <a:schemeClr val="accent1"/>
+                </a:solidFill>
+              </a:rPr>
+              <a:t>MESSAGEix</a:t>
+            </a:r>
+            <a:endParaRPr lang="en-US" dirty="0">
+              <a:solidFill>
+                <a:schemeClr val="accent1"/>
+              </a:solidFill>
+            </a:endParaRPr>
+          </a:p>
+          <a:p>
+            <a:pPr algn="ctr"/>
+            <a:endParaRPr lang="en-US" dirty="0">
+              <a:solidFill>
+                <a:schemeClr val="accent1"/>
+              </a:solidFill>
+            </a:endParaRPr>
+          </a:p>
+          <a:p>
+            <a:pPr algn="ctr"/>
+            <a:endParaRPr lang="en-US" dirty="0">
+              <a:solidFill>
+                <a:schemeClr val="accent1"/>
+              </a:solidFill>
+            </a:endParaRPr>
+          </a:p>
+          <a:p>
+            <a:pPr algn="ctr"/>
+            <a:endParaRPr lang="en-US" dirty="0">
+              <a:solidFill>
+                <a:schemeClr val="accent1"/>
+              </a:solidFill>
+            </a:endParaRPr>
+          </a:p>
+          <a:p>
+            <a:pPr algn="ctr"/>
+            <a:endParaRPr lang="en-US" dirty="0">
+              <a:solidFill>
+                <a:schemeClr val="accent1"/>
+              </a:solidFill>
+            </a:endParaRPr>
+          </a:p>
+          <a:p>
+            <a:pPr algn="ctr"/>
+            <a:endParaRPr lang="en-US" dirty="0">
+              <a:solidFill>
+                <a:schemeClr val="accent1"/>
+              </a:solidFill>
+            </a:endParaRPr>
+          </a:p>
+        </p:txBody>
+      </p:sp>
+      <p:grpSp>
+        <p:nvGrpSpPr>
+          <p:cNvPr id="31" name="Group 30">
+            <a:extLst>
+              <a:ext uri="{FF2B5EF4-FFF2-40B4-BE49-F238E27FC236}">
+                <a16:creationId xmlns:a16="http://schemas.microsoft.com/office/drawing/2014/main" id="{379FC4B4-29A9-431C-B985-60E1EC24CC24}"/>
+              </a:ext>
+            </a:extLst>
+          </p:cNvPr>
+          <p:cNvGrpSpPr/>
+          <p:nvPr/>
+        </p:nvGrpSpPr>
+        <p:grpSpPr>
+          <a:xfrm>
+            <a:off x="659718" y="5127651"/>
+            <a:ext cx="5096427" cy="1559450"/>
+            <a:chOff x="546430" y="2589453"/>
+            <a:chExt cx="5096427" cy="1559450"/>
+          </a:xfrm>
+        </p:grpSpPr>
+        <p:sp>
+          <p:nvSpPr>
+            <p:cNvPr id="9" name="Rectangle 8">
+              <a:extLst>
+                <a:ext uri="{FF2B5EF4-FFF2-40B4-BE49-F238E27FC236}">
+                  <a16:creationId xmlns:a16="http://schemas.microsoft.com/office/drawing/2014/main" id="{0A43E6FF-3D8B-4B8C-8770-50FD2FEAEA91}"/>
+                </a:ext>
+              </a:extLst>
+            </p:cNvPr>
+            <p:cNvSpPr/>
+            <p:nvPr/>
+          </p:nvSpPr>
+          <p:spPr>
+            <a:xfrm>
+              <a:off x="1174899" y="2628450"/>
+              <a:ext cx="843280" cy="351892"/>
+            </a:xfrm>
+            <a:prstGeom prst="rect">
+              <a:avLst/>
+            </a:prstGeom>
+            <a:solidFill>
+              <a:schemeClr val="accent2">
+                <a:lumMod val="75000"/>
+              </a:schemeClr>
+            </a:solidFill>
+          </p:spPr>
+          <p:style>
+            <a:lnRef idx="2">
+              <a:schemeClr val="accent1">
+                <a:shade val="50000"/>
+              </a:schemeClr>
+            </a:lnRef>
+            <a:fillRef idx="1">
+              <a:schemeClr val="accent1"/>
+            </a:fillRef>
+            <a:effectRef idx="0">
+              <a:schemeClr val="accent1"/>
+            </a:effectRef>
+            <a:fontRef idx="minor">
+              <a:schemeClr val="lt1"/>
+            </a:fontRef>
+          </p:style>
+          <p:txBody>
+            <a:bodyPr rtlCol="0" anchor="ctr"/>
+            <a:lstStyle/>
+            <a:p>
+              <a:pPr algn="ctr"/>
+              <a:r>
+                <a:rPr lang="en-US" sz="1200"/>
+                <a:t>Secondary</a:t>
+              </a:r>
+            </a:p>
+          </p:txBody>
+        </p:sp>
+        <p:sp>
+          <p:nvSpPr>
+            <p:cNvPr id="11" name="Rectangle 10">
+              <a:extLst>
+                <a:ext uri="{FF2B5EF4-FFF2-40B4-BE49-F238E27FC236}">
+                  <a16:creationId xmlns:a16="http://schemas.microsoft.com/office/drawing/2014/main" id="{7E59390D-5106-4771-A197-D4FF66BEEA4E}"/>
+                </a:ext>
+              </a:extLst>
+            </p:cNvPr>
+            <p:cNvSpPr/>
+            <p:nvPr/>
+          </p:nvSpPr>
+          <p:spPr>
+            <a:xfrm>
+              <a:off x="546430" y="3164105"/>
+              <a:ext cx="528320" cy="780493"/>
+            </a:xfrm>
+            <a:prstGeom prst="rect">
+              <a:avLst/>
+            </a:prstGeom>
+          </p:spPr>
+          <p:style>
+            <a:lnRef idx="2">
+              <a:schemeClr val="accent1">
+                <a:shade val="50000"/>
+              </a:schemeClr>
+            </a:lnRef>
+            <a:fillRef idx="1">
+              <a:schemeClr val="accent1"/>
+            </a:fillRef>
+            <a:effectRef idx="0">
+              <a:schemeClr val="accent1"/>
+            </a:effectRef>
+            <a:fontRef idx="minor">
+              <a:schemeClr val="lt1"/>
+            </a:fontRef>
+          </p:style>
+          <p:txBody>
+            <a:bodyPr rtlCol="0" anchor="ctr"/>
+            <a:lstStyle/>
+            <a:p>
+              <a:pPr algn="ctr"/>
+              <a:r>
+                <a:rPr lang="en-US" sz="1000" dirty="0"/>
+                <a:t>powerplants</a:t>
+              </a:r>
+            </a:p>
+          </p:txBody>
+        </p:sp>
+        <p:sp>
+          <p:nvSpPr>
+            <p:cNvPr id="12" name="Rectangle 11">
+              <a:extLst>
+                <a:ext uri="{FF2B5EF4-FFF2-40B4-BE49-F238E27FC236}">
+                  <a16:creationId xmlns:a16="http://schemas.microsoft.com/office/drawing/2014/main" id="{DE5732EA-5054-4278-8C41-D6099728C4F5}"/>
+                </a:ext>
+              </a:extLst>
+            </p:cNvPr>
+            <p:cNvSpPr/>
+            <p:nvPr/>
+          </p:nvSpPr>
+          <p:spPr>
+            <a:xfrm>
+              <a:off x="2012697" y="3164105"/>
+              <a:ext cx="743757" cy="780493"/>
+            </a:xfrm>
+            <a:prstGeom prst="rect">
+              <a:avLst/>
+            </a:prstGeom>
+          </p:spPr>
+          <p:style>
+            <a:lnRef idx="2">
+              <a:schemeClr val="accent1">
+                <a:shade val="50000"/>
+              </a:schemeClr>
+            </a:lnRef>
+            <a:fillRef idx="1">
+              <a:schemeClr val="accent1"/>
+            </a:fillRef>
+            <a:effectRef idx="0">
+              <a:schemeClr val="accent1"/>
+            </a:effectRef>
+            <a:fontRef idx="minor">
+              <a:schemeClr val="lt1"/>
+            </a:fontRef>
+          </p:style>
+          <p:txBody>
+            <a:bodyPr rtlCol="0" anchor="ctr"/>
+            <a:lstStyle/>
+            <a:p>
+              <a:pPr algn="ctr"/>
+              <a:r>
+                <a:rPr lang="en-US" sz="1000" dirty="0"/>
+                <a:t>electricity grid</a:t>
+              </a:r>
+            </a:p>
+          </p:txBody>
+        </p:sp>
+        <p:sp>
+          <p:nvSpPr>
+            <p:cNvPr id="13" name="Rectangle 12">
+              <a:extLst>
+                <a:ext uri="{FF2B5EF4-FFF2-40B4-BE49-F238E27FC236}">
+                  <a16:creationId xmlns:a16="http://schemas.microsoft.com/office/drawing/2014/main" id="{4AA93327-9D89-4C36-8C33-C0294B45B39B}"/>
+                </a:ext>
+              </a:extLst>
+            </p:cNvPr>
+            <p:cNvSpPr/>
+            <p:nvPr/>
+          </p:nvSpPr>
+          <p:spPr>
+            <a:xfrm>
+              <a:off x="2791926" y="2628450"/>
+              <a:ext cx="843280" cy="351892"/>
+            </a:xfrm>
+            <a:prstGeom prst="rect">
+              <a:avLst/>
+            </a:prstGeom>
+            <a:solidFill>
+              <a:schemeClr val="accent2">
+                <a:lumMod val="75000"/>
+              </a:schemeClr>
+            </a:solidFill>
+          </p:spPr>
+          <p:style>
+            <a:lnRef idx="2">
+              <a:schemeClr val="accent1">
+                <a:shade val="50000"/>
+              </a:schemeClr>
+            </a:lnRef>
+            <a:fillRef idx="1">
+              <a:schemeClr val="accent1"/>
+            </a:fillRef>
+            <a:effectRef idx="0">
+              <a:schemeClr val="accent1"/>
+            </a:effectRef>
+            <a:fontRef idx="minor">
+              <a:schemeClr val="lt1"/>
+            </a:fontRef>
+          </p:style>
+          <p:txBody>
+            <a:bodyPr rtlCol="0" anchor="ctr"/>
+            <a:lstStyle/>
+            <a:p>
+              <a:pPr algn="ctr"/>
+              <a:r>
+                <a:rPr lang="en-US" sz="1200"/>
+                <a:t>Final</a:t>
+              </a:r>
+            </a:p>
+          </p:txBody>
+        </p:sp>
+        <p:sp>
+          <p:nvSpPr>
+            <p:cNvPr id="14" name="Rectangle 13">
+              <a:extLst>
+                <a:ext uri="{FF2B5EF4-FFF2-40B4-BE49-F238E27FC236}">
+                  <a16:creationId xmlns:a16="http://schemas.microsoft.com/office/drawing/2014/main" id="{AC711A3D-8D82-4E12-A75B-A2E7B441E0D5}"/>
+                </a:ext>
+              </a:extLst>
+            </p:cNvPr>
+            <p:cNvSpPr/>
+            <p:nvPr/>
+          </p:nvSpPr>
+          <p:spPr>
+            <a:xfrm>
+              <a:off x="3708006" y="3164105"/>
+              <a:ext cx="667064" cy="780493"/>
+            </a:xfrm>
+            <a:prstGeom prst="rect">
+              <a:avLst/>
+            </a:prstGeom>
+          </p:spPr>
+          <p:style>
+            <a:lnRef idx="2">
+              <a:schemeClr val="accent1">
+                <a:shade val="50000"/>
+              </a:schemeClr>
+            </a:lnRef>
+            <a:fillRef idx="1">
+              <a:schemeClr val="accent1"/>
+            </a:fillRef>
+            <a:effectRef idx="0">
+              <a:schemeClr val="accent1"/>
+            </a:effectRef>
+            <a:fontRef idx="minor">
+              <a:schemeClr val="lt1"/>
+            </a:fontRef>
+          </p:style>
+          <p:txBody>
+            <a:bodyPr rtlCol="0" anchor="ctr"/>
+            <a:lstStyle/>
+            <a:p>
+              <a:pPr algn="ctr"/>
+              <a:r>
+                <a:rPr lang="en-US" sz="1000" dirty="0"/>
+                <a:t>light-bulbs</a:t>
+              </a:r>
+            </a:p>
+          </p:txBody>
+        </p:sp>
+        <p:cxnSp>
+          <p:nvCxnSpPr>
+            <p:cNvPr id="19" name="Straight Connector 18">
+              <a:extLst>
+                <a:ext uri="{FF2B5EF4-FFF2-40B4-BE49-F238E27FC236}">
+                  <a16:creationId xmlns:a16="http://schemas.microsoft.com/office/drawing/2014/main" id="{69EE56C4-80BF-4294-99EF-438A75900020}"/>
+                </a:ext>
+              </a:extLst>
+            </p:cNvPr>
+            <p:cNvCxnSpPr>
+              <a:cxnSpLocks/>
+            </p:cNvCxnSpPr>
+            <p:nvPr/>
+          </p:nvCxnSpPr>
+          <p:spPr>
+            <a:xfrm>
+              <a:off x="1596539" y="2980342"/>
+              <a:ext cx="0" cy="964256"/>
+            </a:xfrm>
+            <a:prstGeom prst="line">
+              <a:avLst/>
+            </a:prstGeom>
+            <a:ln w="19050">
+              <a:solidFill>
+                <a:schemeClr val="accent2">
+                  <a:lumMod val="75000"/>
+                </a:schemeClr>
+              </a:solidFill>
+            </a:ln>
+          </p:spPr>
+          <p:style>
+            <a:lnRef idx="1">
+              <a:schemeClr val="accent1"/>
+            </a:lnRef>
+            <a:fillRef idx="0">
+              <a:schemeClr val="accent1"/>
+            </a:fillRef>
+            <a:effectRef idx="0">
+              <a:schemeClr val="accent1"/>
+            </a:effectRef>
+            <a:fontRef idx="minor">
+              <a:schemeClr val="tx1"/>
+            </a:fontRef>
+          </p:style>
+        </p:cxnSp>
+        <p:cxnSp>
+          <p:nvCxnSpPr>
+            <p:cNvPr id="20" name="Straight Connector 19">
+              <a:extLst>
+                <a:ext uri="{FF2B5EF4-FFF2-40B4-BE49-F238E27FC236}">
+                  <a16:creationId xmlns:a16="http://schemas.microsoft.com/office/drawing/2014/main" id="{841B13F5-C05D-4D12-A4C9-DEEFF32B954F}"/>
+                </a:ext>
+              </a:extLst>
+            </p:cNvPr>
+            <p:cNvCxnSpPr>
+              <a:cxnSpLocks/>
+            </p:cNvCxnSpPr>
+            <p:nvPr/>
+          </p:nvCxnSpPr>
+          <p:spPr>
+            <a:xfrm>
+              <a:off x="3213566" y="2980342"/>
+              <a:ext cx="0" cy="964256"/>
+            </a:xfrm>
+            <a:prstGeom prst="line">
+              <a:avLst/>
+            </a:prstGeom>
+            <a:ln w="19050">
+              <a:solidFill>
+                <a:schemeClr val="accent2">
+                  <a:lumMod val="75000"/>
+                </a:schemeClr>
+              </a:solidFill>
+            </a:ln>
+          </p:spPr>
+          <p:style>
+            <a:lnRef idx="1">
+              <a:schemeClr val="accent1"/>
+            </a:lnRef>
+            <a:fillRef idx="0">
+              <a:schemeClr val="accent1"/>
+            </a:fillRef>
+            <a:effectRef idx="0">
+              <a:schemeClr val="accent1"/>
+            </a:effectRef>
+            <a:fontRef idx="minor">
+              <a:schemeClr val="tx1"/>
+            </a:fontRef>
+          </p:style>
+        </p:cxnSp>
+        <p:cxnSp>
+          <p:nvCxnSpPr>
+            <p:cNvPr id="32" name="Straight Arrow Connector 31">
+              <a:extLst>
+                <a:ext uri="{FF2B5EF4-FFF2-40B4-BE49-F238E27FC236}">
+                  <a16:creationId xmlns:a16="http://schemas.microsoft.com/office/drawing/2014/main" id="{7786D42F-A727-4E3A-8A75-A41CB2A1B54C}"/>
+                </a:ext>
+              </a:extLst>
+            </p:cNvPr>
+            <p:cNvCxnSpPr>
+              <a:cxnSpLocks/>
+              <a:stCxn id="11" idx="3"/>
+            </p:cNvCxnSpPr>
+            <p:nvPr/>
+          </p:nvCxnSpPr>
+          <p:spPr>
+            <a:xfrm flipV="1">
+              <a:off x="1074750" y="3550649"/>
+              <a:ext cx="521789" cy="3703"/>
+            </a:xfrm>
+            <a:prstGeom prst="straightConnector1">
+              <a:avLst/>
+            </a:prstGeom>
+            <a:ln>
+              <a:tailEnd type="triangle"/>
+            </a:ln>
+          </p:spPr>
+          <p:style>
+            <a:lnRef idx="1">
+              <a:schemeClr val="accent1"/>
+            </a:lnRef>
+            <a:fillRef idx="0">
+              <a:schemeClr val="accent1"/>
+            </a:fillRef>
+            <a:effectRef idx="0">
+              <a:schemeClr val="accent1"/>
+            </a:effectRef>
+            <a:fontRef idx="minor">
+              <a:schemeClr val="tx1"/>
+            </a:fontRef>
+          </p:style>
+        </p:cxnSp>
+        <p:cxnSp>
+          <p:nvCxnSpPr>
+            <p:cNvPr id="35" name="Straight Arrow Connector 34">
+              <a:extLst>
+                <a:ext uri="{FF2B5EF4-FFF2-40B4-BE49-F238E27FC236}">
+                  <a16:creationId xmlns:a16="http://schemas.microsoft.com/office/drawing/2014/main" id="{A09EF36C-80F4-4537-B423-AFE582EDC77A}"/>
+                </a:ext>
+              </a:extLst>
+            </p:cNvPr>
+            <p:cNvCxnSpPr>
+              <a:cxnSpLocks/>
+              <a:endCxn id="12" idx="1"/>
+            </p:cNvCxnSpPr>
+            <p:nvPr/>
+          </p:nvCxnSpPr>
+          <p:spPr>
+            <a:xfrm>
+              <a:off x="1603071" y="3550649"/>
+              <a:ext cx="409626" cy="3703"/>
+            </a:xfrm>
+            <a:prstGeom prst="straightConnector1">
+              <a:avLst/>
+            </a:prstGeom>
+            <a:ln>
+              <a:tailEnd type="triangle"/>
+            </a:ln>
+          </p:spPr>
+          <p:style>
+            <a:lnRef idx="1">
+              <a:schemeClr val="accent1"/>
+            </a:lnRef>
+            <a:fillRef idx="0">
+              <a:schemeClr val="accent1"/>
+            </a:fillRef>
+            <a:effectRef idx="0">
+              <a:schemeClr val="accent1"/>
+            </a:effectRef>
+            <a:fontRef idx="minor">
+              <a:schemeClr val="tx1"/>
+            </a:fontRef>
+          </p:style>
+        </p:cxnSp>
+        <p:cxnSp>
+          <p:nvCxnSpPr>
+            <p:cNvPr id="39" name="Straight Arrow Connector 38">
+              <a:extLst>
+                <a:ext uri="{FF2B5EF4-FFF2-40B4-BE49-F238E27FC236}">
+                  <a16:creationId xmlns:a16="http://schemas.microsoft.com/office/drawing/2014/main" id="{33F77096-F2D8-419A-8337-387C7F87E873}"/>
+                </a:ext>
+              </a:extLst>
+            </p:cNvPr>
+            <p:cNvCxnSpPr>
+              <a:cxnSpLocks/>
+              <a:stCxn id="12" idx="3"/>
+            </p:cNvCxnSpPr>
+            <p:nvPr/>
+          </p:nvCxnSpPr>
+          <p:spPr>
+            <a:xfrm flipV="1">
+              <a:off x="2756454" y="3550650"/>
+              <a:ext cx="457112" cy="3702"/>
+            </a:xfrm>
+            <a:prstGeom prst="straightConnector1">
+              <a:avLst/>
+            </a:prstGeom>
+            <a:ln>
+              <a:tailEnd type="triangle"/>
+            </a:ln>
+          </p:spPr>
+          <p:style>
+            <a:lnRef idx="1">
+              <a:schemeClr val="accent1"/>
+            </a:lnRef>
+            <a:fillRef idx="0">
+              <a:schemeClr val="accent1"/>
+            </a:fillRef>
+            <a:effectRef idx="0">
+              <a:schemeClr val="accent1"/>
+            </a:effectRef>
+            <a:fontRef idx="minor">
+              <a:schemeClr val="tx1"/>
+            </a:fontRef>
+          </p:style>
+        </p:cxnSp>
+        <p:cxnSp>
+          <p:nvCxnSpPr>
+            <p:cNvPr id="41" name="Straight Arrow Connector 40">
+              <a:extLst>
+                <a:ext uri="{FF2B5EF4-FFF2-40B4-BE49-F238E27FC236}">
+                  <a16:creationId xmlns:a16="http://schemas.microsoft.com/office/drawing/2014/main" id="{23FA1B6D-A013-4953-A549-42E49E56BE78}"/>
+                </a:ext>
+              </a:extLst>
+            </p:cNvPr>
+            <p:cNvCxnSpPr>
+              <a:cxnSpLocks/>
+              <a:endCxn id="14" idx="1"/>
+            </p:cNvCxnSpPr>
+            <p:nvPr/>
+          </p:nvCxnSpPr>
+          <p:spPr>
+            <a:xfrm>
+              <a:off x="3213566" y="3550649"/>
+              <a:ext cx="494440" cy="3703"/>
+            </a:xfrm>
+            <a:prstGeom prst="straightConnector1">
+              <a:avLst/>
+            </a:prstGeom>
+            <a:ln>
+              <a:tailEnd type="triangle"/>
+            </a:ln>
+          </p:spPr>
+          <p:style>
+            <a:lnRef idx="1">
+              <a:schemeClr val="accent1"/>
+            </a:lnRef>
+            <a:fillRef idx="0">
+              <a:schemeClr val="accent1"/>
+            </a:fillRef>
+            <a:effectRef idx="0">
+              <a:schemeClr val="accent1"/>
+            </a:effectRef>
+            <a:fontRef idx="minor">
+              <a:schemeClr val="tx1"/>
+            </a:fontRef>
+          </p:style>
+        </p:cxnSp>
+        <p:sp>
+          <p:nvSpPr>
+            <p:cNvPr id="64" name="Rectangle 63">
+              <a:extLst>
+                <a:ext uri="{FF2B5EF4-FFF2-40B4-BE49-F238E27FC236}">
+                  <a16:creationId xmlns:a16="http://schemas.microsoft.com/office/drawing/2014/main" id="{1ED66E46-B2FB-45A6-AD24-32B99FBF7B7B}"/>
+                </a:ext>
+              </a:extLst>
+            </p:cNvPr>
+            <p:cNvSpPr/>
+            <p:nvPr/>
+          </p:nvSpPr>
+          <p:spPr>
+            <a:xfrm>
+              <a:off x="4414544" y="2589453"/>
+              <a:ext cx="843280" cy="351892"/>
+            </a:xfrm>
+            <a:prstGeom prst="rect">
+              <a:avLst/>
+            </a:prstGeom>
+            <a:solidFill>
+              <a:schemeClr val="accent2">
+                <a:lumMod val="75000"/>
+              </a:schemeClr>
+            </a:solidFill>
+          </p:spPr>
+          <p:style>
+            <a:lnRef idx="2">
+              <a:schemeClr val="accent1">
+                <a:shade val="50000"/>
+              </a:schemeClr>
+            </a:lnRef>
+            <a:fillRef idx="1">
+              <a:schemeClr val="accent1"/>
+            </a:fillRef>
+            <a:effectRef idx="0">
+              <a:schemeClr val="accent1"/>
+            </a:effectRef>
+            <a:fontRef idx="minor">
+              <a:schemeClr val="lt1"/>
+            </a:fontRef>
+          </p:style>
+          <p:txBody>
+            <a:bodyPr rtlCol="0" anchor="ctr"/>
+            <a:lstStyle/>
+            <a:p>
+              <a:pPr algn="ctr"/>
+              <a:r>
+                <a:rPr lang="en-US" sz="1200" dirty="0"/>
+                <a:t>Useful</a:t>
+              </a:r>
+            </a:p>
+          </p:txBody>
+        </p:sp>
+        <p:cxnSp>
+          <p:nvCxnSpPr>
+            <p:cNvPr id="73" name="Straight Connector 72">
+              <a:extLst>
+                <a:ext uri="{FF2B5EF4-FFF2-40B4-BE49-F238E27FC236}">
+                  <a16:creationId xmlns:a16="http://schemas.microsoft.com/office/drawing/2014/main" id="{D1F0F4DA-CB00-4F8F-9CDC-5126C606660B}"/>
+                </a:ext>
+              </a:extLst>
+            </p:cNvPr>
+            <p:cNvCxnSpPr>
+              <a:cxnSpLocks/>
+            </p:cNvCxnSpPr>
+            <p:nvPr/>
+          </p:nvCxnSpPr>
+          <p:spPr>
+            <a:xfrm>
+              <a:off x="4836184" y="2941345"/>
+              <a:ext cx="0" cy="964256"/>
+            </a:xfrm>
+            <a:prstGeom prst="line">
+              <a:avLst/>
+            </a:prstGeom>
+            <a:ln w="19050">
+              <a:solidFill>
+                <a:schemeClr val="accent2">
+                  <a:lumMod val="75000"/>
+                </a:schemeClr>
+              </a:solidFill>
+            </a:ln>
+          </p:spPr>
+          <p:style>
+            <a:lnRef idx="1">
+              <a:schemeClr val="accent1"/>
+            </a:lnRef>
+            <a:fillRef idx="0">
+              <a:schemeClr val="accent1"/>
+            </a:fillRef>
+            <a:effectRef idx="0">
+              <a:schemeClr val="accent1"/>
+            </a:effectRef>
+            <a:fontRef idx="minor">
+              <a:schemeClr val="tx1"/>
+            </a:fontRef>
+          </p:style>
+        </p:cxnSp>
+        <p:cxnSp>
+          <p:nvCxnSpPr>
+            <p:cNvPr id="74" name="Straight Arrow Connector 73">
+              <a:extLst>
+                <a:ext uri="{FF2B5EF4-FFF2-40B4-BE49-F238E27FC236}">
+                  <a16:creationId xmlns:a16="http://schemas.microsoft.com/office/drawing/2014/main" id="{BEB9CDA2-E3D1-423A-BA16-D7F323C9C407}"/>
+                </a:ext>
+              </a:extLst>
+            </p:cNvPr>
+            <p:cNvCxnSpPr>
+              <a:cxnSpLocks/>
+            </p:cNvCxnSpPr>
+            <p:nvPr/>
+          </p:nvCxnSpPr>
+          <p:spPr>
+            <a:xfrm flipV="1">
+              <a:off x="4379072" y="3511653"/>
+              <a:ext cx="457112" cy="3702"/>
+            </a:xfrm>
+            <a:prstGeom prst="straightConnector1">
+              <a:avLst/>
+            </a:prstGeom>
+            <a:ln>
+              <a:tailEnd type="triangle"/>
+            </a:ln>
+          </p:spPr>
+          <p:style>
+            <a:lnRef idx="1">
+              <a:schemeClr val="accent1"/>
+            </a:lnRef>
+            <a:fillRef idx="0">
+              <a:schemeClr val="accent1"/>
+            </a:fillRef>
+            <a:effectRef idx="0">
+              <a:schemeClr val="accent1"/>
+            </a:effectRef>
+            <a:fontRef idx="minor">
+              <a:schemeClr val="tx1"/>
+            </a:fontRef>
+          </p:style>
+        </p:cxnSp>
+        <p:sp>
+          <p:nvSpPr>
+            <p:cNvPr id="30" name="TextBox 29">
+              <a:extLst>
+                <a:ext uri="{FF2B5EF4-FFF2-40B4-BE49-F238E27FC236}">
+                  <a16:creationId xmlns:a16="http://schemas.microsoft.com/office/drawing/2014/main" id="{A12025E6-5FA1-47F4-9EE3-7EEED1EAFD5F}"/>
+                </a:ext>
+              </a:extLst>
+            </p:cNvPr>
+            <p:cNvSpPr txBox="1"/>
+            <p:nvPr/>
+          </p:nvSpPr>
+          <p:spPr>
+            <a:xfrm>
+              <a:off x="787466" y="3887293"/>
+              <a:ext cx="1605064" cy="261610"/>
+            </a:xfrm>
+            <a:prstGeom prst="rect">
+              <a:avLst/>
+            </a:prstGeom>
+            <a:noFill/>
+          </p:spPr>
+          <p:txBody>
+            <a:bodyPr wrap="square" rtlCol="0">
+              <a:spAutoFit/>
+            </a:bodyPr>
+            <a:lstStyle/>
+            <a:p>
+              <a:pPr algn="ctr"/>
+              <a:r>
+                <a:rPr lang="en-US" sz="1100" i="1" dirty="0"/>
+                <a:t>electricity</a:t>
+              </a:r>
+            </a:p>
+          </p:txBody>
+        </p:sp>
+        <p:sp>
+          <p:nvSpPr>
+            <p:cNvPr id="75" name="TextBox 74">
+              <a:extLst>
+                <a:ext uri="{FF2B5EF4-FFF2-40B4-BE49-F238E27FC236}">
+                  <a16:creationId xmlns:a16="http://schemas.microsoft.com/office/drawing/2014/main" id="{C95F7223-C326-4639-978E-EBF6E462BC96}"/>
+                </a:ext>
+              </a:extLst>
+            </p:cNvPr>
+            <p:cNvSpPr txBox="1"/>
+            <p:nvPr/>
+          </p:nvSpPr>
+          <p:spPr>
+            <a:xfrm>
+              <a:off x="2417346" y="3884157"/>
+              <a:ext cx="1605064" cy="261610"/>
+            </a:xfrm>
+            <a:prstGeom prst="rect">
+              <a:avLst/>
+            </a:prstGeom>
+            <a:noFill/>
+          </p:spPr>
+          <p:txBody>
+            <a:bodyPr wrap="square" rtlCol="0">
+              <a:spAutoFit/>
+            </a:bodyPr>
+            <a:lstStyle/>
+            <a:p>
+              <a:pPr algn="ctr"/>
+              <a:r>
+                <a:rPr lang="en-US" sz="1100" i="1" dirty="0"/>
+                <a:t>electricity</a:t>
+              </a:r>
+            </a:p>
+          </p:txBody>
+        </p:sp>
+        <p:sp>
+          <p:nvSpPr>
+            <p:cNvPr id="76" name="TextBox 75">
+              <a:extLst>
+                <a:ext uri="{FF2B5EF4-FFF2-40B4-BE49-F238E27FC236}">
+                  <a16:creationId xmlns:a16="http://schemas.microsoft.com/office/drawing/2014/main" id="{3F90055D-AF21-463C-AE45-485DCA02DCE2}"/>
+                </a:ext>
+              </a:extLst>
+            </p:cNvPr>
+            <p:cNvSpPr txBox="1"/>
+            <p:nvPr/>
+          </p:nvSpPr>
+          <p:spPr>
+            <a:xfrm>
+              <a:off x="4037793" y="3850617"/>
+              <a:ext cx="1605064" cy="261610"/>
+            </a:xfrm>
+            <a:prstGeom prst="rect">
+              <a:avLst/>
+            </a:prstGeom>
+            <a:noFill/>
+          </p:spPr>
+          <p:txBody>
+            <a:bodyPr wrap="square" rtlCol="0">
+              <a:spAutoFit/>
+            </a:bodyPr>
+            <a:lstStyle/>
+            <a:p>
+              <a:pPr algn="ctr"/>
+              <a:r>
+                <a:rPr lang="en-US" sz="1100" i="1" dirty="0"/>
+                <a:t>light</a:t>
+              </a:r>
+            </a:p>
+          </p:txBody>
+        </p:sp>
+      </p:grpSp>
+      <p:sp>
+        <p:nvSpPr>
+          <p:cNvPr id="78" name="Arrow: Down 77">
+            <a:extLst>
+              <a:ext uri="{FF2B5EF4-FFF2-40B4-BE49-F238E27FC236}">
+                <a16:creationId xmlns:a16="http://schemas.microsoft.com/office/drawing/2014/main" id="{63FE05FF-6249-4E9D-904A-47ADFD224811}"/>
+              </a:ext>
+            </a:extLst>
+          </p:cNvPr>
+          <p:cNvSpPr/>
+          <p:nvPr/>
+        </p:nvSpPr>
+        <p:spPr>
+          <a:xfrm>
+            <a:off x="2788546" y="3731054"/>
+            <a:ext cx="426720" cy="1098385"/>
+          </a:xfrm>
+          <a:prstGeom prst="downArrow">
+            <a:avLst/>
+          </a:prstGeom>
+          <a:solidFill>
+            <a:schemeClr val="bg1"/>
+          </a:solidFill>
+        </p:spPr>
+        <p:style>
+          <a:lnRef idx="2">
+            <a:schemeClr val="accent1">
+              <a:shade val="50000"/>
+            </a:schemeClr>
+          </a:lnRef>
+          <a:fillRef idx="1">
+            <a:schemeClr val="accent1"/>
+          </a:fillRef>
+          <a:effectRef idx="0">
+            <a:schemeClr val="accent1"/>
+          </a:effectRef>
+          <a:fontRef idx="minor">
+            <a:schemeClr val="lt1"/>
+          </a:fontRef>
+        </p:style>
+        <p:txBody>
+          <a:bodyPr rtlCol="0" anchor="ctr"/>
+          <a:lstStyle/>
+          <a:p>
+            <a:pPr algn="ctr"/>
+            <a:endParaRPr lang="en-US"/>
+          </a:p>
+        </p:txBody>
+      </p:sp>
+      <p:sp>
+        <p:nvSpPr>
+          <p:cNvPr id="46" name="Rectangle 45">
+            <a:extLst>
+              <a:ext uri="{FF2B5EF4-FFF2-40B4-BE49-F238E27FC236}">
+                <a16:creationId xmlns:a16="http://schemas.microsoft.com/office/drawing/2014/main" id="{28F8C1B5-2825-43BA-8B79-072B3EF0E49A}"/>
+              </a:ext>
+            </a:extLst>
+          </p:cNvPr>
+          <p:cNvSpPr/>
+          <p:nvPr/>
+        </p:nvSpPr>
+        <p:spPr>
+          <a:xfrm>
+            <a:off x="173141" y="3058246"/>
+            <a:ext cx="5693807" cy="780493"/>
+          </a:xfrm>
+          <a:prstGeom prst="rect">
+            <a:avLst/>
+          </a:prstGeom>
+          <a:solidFill>
+            <a:schemeClr val="accent4">
+              <a:lumMod val="40000"/>
+              <a:lumOff val="60000"/>
+            </a:schemeClr>
+          </a:solidFill>
+          <a:effectLst>
+            <a:outerShdw blurRad="50800" dist="38100" dir="2700000" algn="tl" rotWithShape="0">
+              <a:prstClr val="black">
+                <a:alpha val="40000"/>
+              </a:prstClr>
+            </a:outerShdw>
+          </a:effectLst>
+        </p:spPr>
+        <p:style>
+          <a:lnRef idx="2">
+            <a:schemeClr val="accent1">
+              <a:shade val="50000"/>
+            </a:schemeClr>
+          </a:lnRef>
+          <a:fillRef idx="1">
+            <a:schemeClr val="accent1"/>
+          </a:fillRef>
+          <a:effectRef idx="0">
+            <a:schemeClr val="accent1"/>
+          </a:effectRef>
+          <a:fontRef idx="minor">
+            <a:schemeClr val="lt1"/>
+          </a:fontRef>
+        </p:style>
+        <p:txBody>
+          <a:bodyPr rtlCol="0" anchor="ctr"/>
+          <a:lstStyle/>
+          <a:p>
+            <a:pPr algn="ctr"/>
+            <a:r>
+              <a:rPr lang="en-US" dirty="0">
+                <a:solidFill>
+                  <a:sysClr val="windowText" lastClr="000000"/>
+                </a:solidFill>
+              </a:rPr>
+              <a:t>script (</a:t>
+            </a:r>
+            <a:r>
+              <a:rPr lang="en-US" i="1" dirty="0">
+                <a:solidFill>
+                  <a:sysClr val="windowText" lastClr="000000"/>
+                </a:solidFill>
+              </a:rPr>
+              <a:t>python, R, </a:t>
+            </a:r>
+            <a:r>
+              <a:rPr lang="en-US" i="1" dirty="0" err="1">
+                <a:solidFill>
+                  <a:sysClr val="windowText" lastClr="000000"/>
+                </a:solidFill>
+              </a:rPr>
+              <a:t>jupyter</a:t>
+            </a:r>
+            <a:r>
+              <a:rPr lang="en-US" i="1" dirty="0">
+                <a:solidFill>
+                  <a:sysClr val="windowText" lastClr="000000"/>
+                </a:solidFill>
+              </a:rPr>
+              <a:t> notebook)</a:t>
+            </a:r>
+          </a:p>
+        </p:txBody>
+      </p:sp>
+      <p:sp>
+        <p:nvSpPr>
+          <p:cNvPr id="77" name="Arrow: Down 76">
+            <a:extLst>
+              <a:ext uri="{FF2B5EF4-FFF2-40B4-BE49-F238E27FC236}">
+                <a16:creationId xmlns:a16="http://schemas.microsoft.com/office/drawing/2014/main" id="{24A2805B-7D99-40B5-8735-A090E92E6D75}"/>
+              </a:ext>
+            </a:extLst>
+          </p:cNvPr>
+          <p:cNvSpPr/>
+          <p:nvPr/>
+        </p:nvSpPr>
+        <p:spPr>
+          <a:xfrm>
+            <a:off x="2803128" y="2242357"/>
+            <a:ext cx="426720" cy="874979"/>
+          </a:xfrm>
+          <a:prstGeom prst="downArrow">
+            <a:avLst/>
+          </a:prstGeom>
+          <a:solidFill>
+            <a:schemeClr val="bg1"/>
+          </a:solidFill>
+        </p:spPr>
+        <p:style>
+          <a:lnRef idx="2">
+            <a:schemeClr val="accent1">
+              <a:shade val="50000"/>
+            </a:schemeClr>
+          </a:lnRef>
+          <a:fillRef idx="1">
+            <a:schemeClr val="accent1"/>
+          </a:fillRef>
+          <a:effectRef idx="0">
+            <a:schemeClr val="accent1"/>
+          </a:effectRef>
+          <a:fontRef idx="minor">
+            <a:schemeClr val="lt1"/>
+          </a:fontRef>
+        </p:style>
+        <p:txBody>
+          <a:bodyPr rtlCol="0" anchor="ctr"/>
+          <a:lstStyle/>
+          <a:p>
+            <a:pPr algn="ctr"/>
+            <a:endParaRPr lang="en-US"/>
+          </a:p>
+        </p:txBody>
+      </p:sp>
+      <p:sp>
+        <p:nvSpPr>
+          <p:cNvPr id="63" name="Rectangle 62">
+            <a:extLst>
+              <a:ext uri="{FF2B5EF4-FFF2-40B4-BE49-F238E27FC236}">
+                <a16:creationId xmlns:a16="http://schemas.microsoft.com/office/drawing/2014/main" id="{C87DCC9E-B173-42E1-9817-30D033E935D8}"/>
+              </a:ext>
+            </a:extLst>
+          </p:cNvPr>
+          <p:cNvSpPr/>
+          <p:nvPr/>
+        </p:nvSpPr>
+        <p:spPr>
+          <a:xfrm>
+            <a:off x="173141" y="1767927"/>
+            <a:ext cx="5686695" cy="545494"/>
+          </a:xfrm>
+          <a:prstGeom prst="rect">
+            <a:avLst/>
+          </a:prstGeom>
+          <a:solidFill>
+            <a:schemeClr val="accent2"/>
+          </a:solidFill>
+          <a:effectLst>
+            <a:outerShdw blurRad="50800" dist="38100" dir="2700000" algn="tl" rotWithShape="0">
+              <a:prstClr val="black">
+                <a:alpha val="40000"/>
+              </a:prstClr>
+            </a:outerShdw>
+          </a:effectLst>
+        </p:spPr>
+        <p:style>
+          <a:lnRef idx="2">
+            <a:schemeClr val="accent1">
+              <a:shade val="50000"/>
+            </a:schemeClr>
+          </a:lnRef>
+          <a:fillRef idx="1">
+            <a:schemeClr val="accent1"/>
+          </a:fillRef>
+          <a:effectRef idx="0">
+            <a:schemeClr val="accent1"/>
+          </a:effectRef>
+          <a:fontRef idx="minor">
+            <a:schemeClr val="lt1"/>
+          </a:fontRef>
+        </p:style>
+        <p:txBody>
+          <a:bodyPr rtlCol="0" anchor="ctr"/>
+          <a:lstStyle/>
+          <a:p>
+            <a:pPr algn="ctr"/>
+            <a:r>
+              <a:rPr lang="en-US"/>
+              <a:t>Raw data</a:t>
+            </a:r>
+          </a:p>
+        </p:txBody>
+      </p:sp>
+      <p:sp>
+        <p:nvSpPr>
+          <p:cNvPr id="34" name="TextBox 33">
+            <a:extLst>
+              <a:ext uri="{FF2B5EF4-FFF2-40B4-BE49-F238E27FC236}">
+                <a16:creationId xmlns:a16="http://schemas.microsoft.com/office/drawing/2014/main" id="{5C1725EB-8D05-43D6-82CD-4D62C6C090AD}"/>
+              </a:ext>
+            </a:extLst>
+          </p:cNvPr>
+          <p:cNvSpPr txBox="1"/>
+          <p:nvPr/>
+        </p:nvSpPr>
+        <p:spPr>
+          <a:xfrm>
+            <a:off x="97277" y="252919"/>
+            <a:ext cx="5769671" cy="369332"/>
+          </a:xfrm>
+          <a:prstGeom prst="rect">
+            <a:avLst/>
+          </a:prstGeom>
+          <a:noFill/>
+        </p:spPr>
+        <p:txBody>
+          <a:bodyPr wrap="square" rtlCol="0">
+            <a:spAutoFit/>
+          </a:bodyPr>
+          <a:lstStyle/>
+          <a:p>
+            <a:pPr algn="ctr"/>
+            <a:r>
+              <a:rPr lang="en-US" i="1" dirty="0">
+                <a:solidFill>
+                  <a:schemeClr val="bg1"/>
+                </a:solidFill>
+              </a:rPr>
+              <a:t>Workflow as per “original” tutorial.</a:t>
+            </a:r>
+          </a:p>
+        </p:txBody>
+      </p:sp>
+      <p:sp>
+        <p:nvSpPr>
+          <p:cNvPr id="81" name="Rectangle: Rounded Corners 80">
+            <a:extLst>
+              <a:ext uri="{FF2B5EF4-FFF2-40B4-BE49-F238E27FC236}">
+                <a16:creationId xmlns:a16="http://schemas.microsoft.com/office/drawing/2014/main" id="{DF9C28CA-D348-4807-A88F-6DC5313680E7}"/>
+              </a:ext>
+            </a:extLst>
+          </p:cNvPr>
+          <p:cNvSpPr/>
+          <p:nvPr/>
+        </p:nvSpPr>
+        <p:spPr>
+          <a:xfrm>
+            <a:off x="6085758" y="16622"/>
+            <a:ext cx="6022146" cy="6797440"/>
+          </a:xfrm>
+          <a:prstGeom prst="roundRect">
+            <a:avLst>
+              <a:gd name="adj" fmla="val 1142"/>
+            </a:avLst>
+          </a:prstGeom>
+        </p:spPr>
+        <p:style>
+          <a:lnRef idx="2">
+            <a:schemeClr val="accent1">
+              <a:shade val="50000"/>
+            </a:schemeClr>
+          </a:lnRef>
+          <a:fillRef idx="1">
+            <a:schemeClr val="accent1"/>
+          </a:fillRef>
+          <a:effectRef idx="0">
+            <a:schemeClr val="accent1"/>
+          </a:effectRef>
+          <a:fontRef idx="minor">
+            <a:schemeClr val="lt1"/>
+          </a:fontRef>
+        </p:style>
+        <p:txBody>
+          <a:bodyPr rtlCol="0" anchor="ctr"/>
+          <a:lstStyle/>
+          <a:p>
+            <a:pPr algn="ctr"/>
+            <a:endParaRPr lang="en-US"/>
+          </a:p>
+        </p:txBody>
+      </p:sp>
+      <p:sp>
+        <p:nvSpPr>
+          <p:cNvPr id="82" name="Rectangle 81">
+            <a:extLst>
+              <a:ext uri="{FF2B5EF4-FFF2-40B4-BE49-F238E27FC236}">
+                <a16:creationId xmlns:a16="http://schemas.microsoft.com/office/drawing/2014/main" id="{AAF6F347-717A-464E-85E1-61451D87B089}"/>
+              </a:ext>
+            </a:extLst>
+          </p:cNvPr>
+          <p:cNvSpPr/>
+          <p:nvPr/>
+        </p:nvSpPr>
+        <p:spPr>
+          <a:xfrm>
+            <a:off x="6241786" y="4758147"/>
+            <a:ext cx="5693807" cy="1888500"/>
+          </a:xfrm>
+          <a:prstGeom prst="rect">
+            <a:avLst/>
+          </a:prstGeom>
+          <a:solidFill>
+            <a:schemeClr val="accent2">
+              <a:lumMod val="40000"/>
+              <a:lumOff val="60000"/>
+            </a:schemeClr>
+          </a:solidFill>
+          <a:effectLst>
+            <a:outerShdw blurRad="50800" dist="38100" dir="2700000" algn="tl" rotWithShape="0">
+              <a:prstClr val="black">
+                <a:alpha val="40000"/>
+              </a:prstClr>
+            </a:outerShdw>
+          </a:effectLst>
+        </p:spPr>
+        <p:style>
+          <a:lnRef idx="2">
+            <a:schemeClr val="accent1">
+              <a:shade val="50000"/>
+            </a:schemeClr>
+          </a:lnRef>
+          <a:fillRef idx="1">
+            <a:schemeClr val="accent1"/>
+          </a:fillRef>
+          <a:effectRef idx="0">
+            <a:schemeClr val="accent1"/>
+          </a:effectRef>
+          <a:fontRef idx="minor">
+            <a:schemeClr val="lt1"/>
+          </a:fontRef>
+        </p:style>
+        <p:txBody>
+          <a:bodyPr rtlCol="0" anchor="ctr"/>
+          <a:lstStyle/>
+          <a:p>
+            <a:pPr algn="ctr"/>
+            <a:r>
+              <a:rPr lang="en-US" dirty="0" err="1">
+                <a:solidFill>
+                  <a:schemeClr val="accent1"/>
+                </a:solidFill>
+              </a:rPr>
+              <a:t>MESSAGEix</a:t>
+            </a:r>
+            <a:endParaRPr lang="en-US" dirty="0">
+              <a:solidFill>
+                <a:schemeClr val="accent1"/>
+              </a:solidFill>
+            </a:endParaRPr>
+          </a:p>
+          <a:p>
+            <a:pPr algn="ctr"/>
+            <a:endParaRPr lang="en-US" dirty="0">
+              <a:solidFill>
+                <a:schemeClr val="accent1"/>
+              </a:solidFill>
+            </a:endParaRPr>
+          </a:p>
+          <a:p>
+            <a:pPr algn="ctr"/>
+            <a:endParaRPr lang="en-US" dirty="0">
+              <a:solidFill>
+                <a:schemeClr val="accent1"/>
+              </a:solidFill>
+            </a:endParaRPr>
+          </a:p>
+          <a:p>
+            <a:pPr algn="ctr"/>
+            <a:endParaRPr lang="en-US" dirty="0">
+              <a:solidFill>
+                <a:schemeClr val="accent1"/>
+              </a:solidFill>
+            </a:endParaRPr>
+          </a:p>
+          <a:p>
+            <a:pPr algn="ctr"/>
+            <a:endParaRPr lang="en-US" dirty="0">
+              <a:solidFill>
+                <a:schemeClr val="accent1"/>
+              </a:solidFill>
+            </a:endParaRPr>
+          </a:p>
+          <a:p>
+            <a:pPr algn="ctr"/>
+            <a:endParaRPr lang="en-US" dirty="0">
+              <a:solidFill>
+                <a:schemeClr val="accent1"/>
+              </a:solidFill>
+            </a:endParaRPr>
+          </a:p>
+        </p:txBody>
+      </p:sp>
+      <p:grpSp>
+        <p:nvGrpSpPr>
+          <p:cNvPr id="84" name="Group 83">
+            <a:extLst>
+              <a:ext uri="{FF2B5EF4-FFF2-40B4-BE49-F238E27FC236}">
+                <a16:creationId xmlns:a16="http://schemas.microsoft.com/office/drawing/2014/main" id="{F756DDA6-C1FD-45BF-AB8A-2BFB1A9BC7F6}"/>
+              </a:ext>
+            </a:extLst>
+          </p:cNvPr>
+          <p:cNvGrpSpPr/>
+          <p:nvPr/>
+        </p:nvGrpSpPr>
+        <p:grpSpPr>
+          <a:xfrm>
+            <a:off x="6728362" y="5127651"/>
+            <a:ext cx="5096427" cy="1559450"/>
+            <a:chOff x="546430" y="2589453"/>
+            <a:chExt cx="5096427" cy="1559450"/>
+          </a:xfrm>
+        </p:grpSpPr>
+        <p:sp>
+          <p:nvSpPr>
+            <p:cNvPr id="85" name="Rectangle 84">
+              <a:extLst>
+                <a:ext uri="{FF2B5EF4-FFF2-40B4-BE49-F238E27FC236}">
+                  <a16:creationId xmlns:a16="http://schemas.microsoft.com/office/drawing/2014/main" id="{2A685D19-FE62-4E44-9AA0-D669A9BA2DE2}"/>
+                </a:ext>
+              </a:extLst>
+            </p:cNvPr>
+            <p:cNvSpPr/>
+            <p:nvPr/>
+          </p:nvSpPr>
+          <p:spPr>
+            <a:xfrm>
+              <a:off x="1174899" y="2628450"/>
+              <a:ext cx="843280" cy="351892"/>
+            </a:xfrm>
+            <a:prstGeom prst="rect">
+              <a:avLst/>
+            </a:prstGeom>
+            <a:solidFill>
+              <a:schemeClr val="accent2">
+                <a:lumMod val="75000"/>
+              </a:schemeClr>
+            </a:solidFill>
+          </p:spPr>
+          <p:style>
+            <a:lnRef idx="2">
+              <a:schemeClr val="accent1">
+                <a:shade val="50000"/>
+              </a:schemeClr>
+            </a:lnRef>
+            <a:fillRef idx="1">
+              <a:schemeClr val="accent1"/>
+            </a:fillRef>
+            <a:effectRef idx="0">
+              <a:schemeClr val="accent1"/>
+            </a:effectRef>
+            <a:fontRef idx="minor">
+              <a:schemeClr val="lt1"/>
+            </a:fontRef>
+          </p:style>
+          <p:txBody>
+            <a:bodyPr rtlCol="0" anchor="ctr"/>
+            <a:lstStyle/>
+            <a:p>
+              <a:pPr algn="ctr"/>
+              <a:r>
+                <a:rPr lang="en-US" sz="1200"/>
+                <a:t>Secondary</a:t>
+              </a:r>
+            </a:p>
+          </p:txBody>
+        </p:sp>
+        <p:sp>
+          <p:nvSpPr>
+            <p:cNvPr id="86" name="Rectangle 85">
+              <a:extLst>
+                <a:ext uri="{FF2B5EF4-FFF2-40B4-BE49-F238E27FC236}">
+                  <a16:creationId xmlns:a16="http://schemas.microsoft.com/office/drawing/2014/main" id="{1A57C978-3482-4AEB-B134-535AA629143A}"/>
+                </a:ext>
+              </a:extLst>
+            </p:cNvPr>
+            <p:cNvSpPr/>
+            <p:nvPr/>
+          </p:nvSpPr>
+          <p:spPr>
+            <a:xfrm>
+              <a:off x="546430" y="3164105"/>
+              <a:ext cx="528320" cy="780493"/>
+            </a:xfrm>
+            <a:prstGeom prst="rect">
+              <a:avLst/>
+            </a:prstGeom>
+          </p:spPr>
+          <p:style>
+            <a:lnRef idx="2">
+              <a:schemeClr val="accent1">
+                <a:shade val="50000"/>
+              </a:schemeClr>
+            </a:lnRef>
+            <a:fillRef idx="1">
+              <a:schemeClr val="accent1"/>
+            </a:fillRef>
+            <a:effectRef idx="0">
+              <a:schemeClr val="accent1"/>
+            </a:effectRef>
+            <a:fontRef idx="minor">
+              <a:schemeClr val="lt1"/>
+            </a:fontRef>
+          </p:style>
+          <p:txBody>
+            <a:bodyPr rtlCol="0" anchor="ctr"/>
+            <a:lstStyle/>
+            <a:p>
+              <a:pPr algn="ctr"/>
+              <a:r>
+                <a:rPr lang="en-US" sz="1000" dirty="0"/>
+                <a:t>powerplants</a:t>
+              </a:r>
+            </a:p>
+          </p:txBody>
+        </p:sp>
+        <p:sp>
+          <p:nvSpPr>
+            <p:cNvPr id="87" name="Rectangle 86">
+              <a:extLst>
+                <a:ext uri="{FF2B5EF4-FFF2-40B4-BE49-F238E27FC236}">
+                  <a16:creationId xmlns:a16="http://schemas.microsoft.com/office/drawing/2014/main" id="{98F2C8E1-6C56-4CA0-B384-1CB32D5B7609}"/>
+                </a:ext>
+              </a:extLst>
+            </p:cNvPr>
+            <p:cNvSpPr/>
+            <p:nvPr/>
+          </p:nvSpPr>
+          <p:spPr>
+            <a:xfrm>
+              <a:off x="2012697" y="3164105"/>
+              <a:ext cx="743757" cy="780493"/>
+            </a:xfrm>
+            <a:prstGeom prst="rect">
+              <a:avLst/>
+            </a:prstGeom>
+          </p:spPr>
+          <p:style>
+            <a:lnRef idx="2">
+              <a:schemeClr val="accent1">
+                <a:shade val="50000"/>
+              </a:schemeClr>
+            </a:lnRef>
+            <a:fillRef idx="1">
+              <a:schemeClr val="accent1"/>
+            </a:fillRef>
+            <a:effectRef idx="0">
+              <a:schemeClr val="accent1"/>
+            </a:effectRef>
+            <a:fontRef idx="minor">
+              <a:schemeClr val="lt1"/>
+            </a:fontRef>
+          </p:style>
+          <p:txBody>
+            <a:bodyPr rtlCol="0" anchor="ctr"/>
+            <a:lstStyle/>
+            <a:p>
+              <a:pPr algn="ctr"/>
+              <a:r>
+                <a:rPr lang="en-US" sz="1000" dirty="0"/>
+                <a:t>electricity grid</a:t>
+              </a:r>
+            </a:p>
+          </p:txBody>
+        </p:sp>
+        <p:sp>
+          <p:nvSpPr>
+            <p:cNvPr id="88" name="Rectangle 87">
+              <a:extLst>
+                <a:ext uri="{FF2B5EF4-FFF2-40B4-BE49-F238E27FC236}">
+                  <a16:creationId xmlns:a16="http://schemas.microsoft.com/office/drawing/2014/main" id="{C1DEB664-4931-4A4D-B2AB-6466288DA36E}"/>
+                </a:ext>
+              </a:extLst>
+            </p:cNvPr>
+            <p:cNvSpPr/>
+            <p:nvPr/>
+          </p:nvSpPr>
+          <p:spPr>
+            <a:xfrm>
+              <a:off x="2791926" y="2628450"/>
+              <a:ext cx="843280" cy="351892"/>
+            </a:xfrm>
+            <a:prstGeom prst="rect">
+              <a:avLst/>
+            </a:prstGeom>
+            <a:solidFill>
+              <a:schemeClr val="accent2">
+                <a:lumMod val="75000"/>
+              </a:schemeClr>
+            </a:solidFill>
+          </p:spPr>
+          <p:style>
+            <a:lnRef idx="2">
+              <a:schemeClr val="accent1">
+                <a:shade val="50000"/>
+              </a:schemeClr>
+            </a:lnRef>
+            <a:fillRef idx="1">
+              <a:schemeClr val="accent1"/>
+            </a:fillRef>
+            <a:effectRef idx="0">
+              <a:schemeClr val="accent1"/>
+            </a:effectRef>
+            <a:fontRef idx="minor">
+              <a:schemeClr val="lt1"/>
+            </a:fontRef>
+          </p:style>
+          <p:txBody>
+            <a:bodyPr rtlCol="0" anchor="ctr"/>
+            <a:lstStyle/>
+            <a:p>
+              <a:pPr algn="ctr"/>
+              <a:r>
+                <a:rPr lang="en-US" sz="1200"/>
+                <a:t>Final</a:t>
+              </a:r>
+            </a:p>
+          </p:txBody>
+        </p:sp>
+        <p:sp>
+          <p:nvSpPr>
+            <p:cNvPr id="89" name="Rectangle 88">
+              <a:extLst>
+                <a:ext uri="{FF2B5EF4-FFF2-40B4-BE49-F238E27FC236}">
+                  <a16:creationId xmlns:a16="http://schemas.microsoft.com/office/drawing/2014/main" id="{11CA5AE0-E329-4DF3-A88F-64DAD05CE839}"/>
+                </a:ext>
+              </a:extLst>
+            </p:cNvPr>
+            <p:cNvSpPr/>
+            <p:nvPr/>
+          </p:nvSpPr>
+          <p:spPr>
+            <a:xfrm>
+              <a:off x="3708006" y="3164105"/>
+              <a:ext cx="667064" cy="780493"/>
+            </a:xfrm>
+            <a:prstGeom prst="rect">
+              <a:avLst/>
+            </a:prstGeom>
+          </p:spPr>
+          <p:style>
+            <a:lnRef idx="2">
+              <a:schemeClr val="accent1">
+                <a:shade val="50000"/>
+              </a:schemeClr>
+            </a:lnRef>
+            <a:fillRef idx="1">
+              <a:schemeClr val="accent1"/>
+            </a:fillRef>
+            <a:effectRef idx="0">
+              <a:schemeClr val="accent1"/>
+            </a:effectRef>
+            <a:fontRef idx="minor">
+              <a:schemeClr val="lt1"/>
+            </a:fontRef>
+          </p:style>
+          <p:txBody>
+            <a:bodyPr rtlCol="0" anchor="ctr"/>
+            <a:lstStyle/>
+            <a:p>
+              <a:pPr algn="ctr"/>
+              <a:r>
+                <a:rPr lang="en-US" sz="1000" dirty="0"/>
+                <a:t>light-bulbs</a:t>
+              </a:r>
+            </a:p>
+          </p:txBody>
+        </p:sp>
+        <p:cxnSp>
+          <p:nvCxnSpPr>
+            <p:cNvPr id="90" name="Straight Connector 89">
+              <a:extLst>
+                <a:ext uri="{FF2B5EF4-FFF2-40B4-BE49-F238E27FC236}">
+                  <a16:creationId xmlns:a16="http://schemas.microsoft.com/office/drawing/2014/main" id="{F0A99630-7A31-4186-897D-3966838B6780}"/>
+                </a:ext>
+              </a:extLst>
+            </p:cNvPr>
+            <p:cNvCxnSpPr>
+              <a:cxnSpLocks/>
+            </p:cNvCxnSpPr>
+            <p:nvPr/>
+          </p:nvCxnSpPr>
+          <p:spPr>
+            <a:xfrm>
+              <a:off x="1596539" y="2980342"/>
+              <a:ext cx="0" cy="964256"/>
+            </a:xfrm>
+            <a:prstGeom prst="line">
+              <a:avLst/>
+            </a:prstGeom>
+            <a:ln w="19050">
+              <a:solidFill>
+                <a:schemeClr val="accent2">
+                  <a:lumMod val="75000"/>
+                </a:schemeClr>
+              </a:solidFill>
+            </a:ln>
+          </p:spPr>
+          <p:style>
+            <a:lnRef idx="1">
+              <a:schemeClr val="accent1"/>
+            </a:lnRef>
+            <a:fillRef idx="0">
+              <a:schemeClr val="accent1"/>
+            </a:fillRef>
+            <a:effectRef idx="0">
+              <a:schemeClr val="accent1"/>
+            </a:effectRef>
+            <a:fontRef idx="minor">
+              <a:schemeClr val="tx1"/>
+            </a:fontRef>
+          </p:style>
+        </p:cxnSp>
+        <p:cxnSp>
+          <p:nvCxnSpPr>
+            <p:cNvPr id="91" name="Straight Connector 90">
+              <a:extLst>
+                <a:ext uri="{FF2B5EF4-FFF2-40B4-BE49-F238E27FC236}">
+                  <a16:creationId xmlns:a16="http://schemas.microsoft.com/office/drawing/2014/main" id="{FAB89EE8-2976-464C-8F26-BC87A515EF8A}"/>
+                </a:ext>
+              </a:extLst>
+            </p:cNvPr>
+            <p:cNvCxnSpPr>
+              <a:cxnSpLocks/>
+            </p:cNvCxnSpPr>
+            <p:nvPr/>
+          </p:nvCxnSpPr>
+          <p:spPr>
+            <a:xfrm>
+              <a:off x="3213566" y="2980342"/>
+              <a:ext cx="0" cy="964256"/>
+            </a:xfrm>
+            <a:prstGeom prst="line">
+              <a:avLst/>
+            </a:prstGeom>
+            <a:ln w="19050">
+              <a:solidFill>
+                <a:schemeClr val="accent2">
+                  <a:lumMod val="75000"/>
+                </a:schemeClr>
+              </a:solidFill>
+            </a:ln>
+          </p:spPr>
+          <p:style>
+            <a:lnRef idx="1">
+              <a:schemeClr val="accent1"/>
+            </a:lnRef>
+            <a:fillRef idx="0">
+              <a:schemeClr val="accent1"/>
+            </a:fillRef>
+            <a:effectRef idx="0">
+              <a:schemeClr val="accent1"/>
+            </a:effectRef>
+            <a:fontRef idx="minor">
+              <a:schemeClr val="tx1"/>
+            </a:fontRef>
+          </p:style>
+        </p:cxnSp>
+        <p:cxnSp>
+          <p:nvCxnSpPr>
+            <p:cNvPr id="92" name="Straight Arrow Connector 91">
+              <a:extLst>
+                <a:ext uri="{FF2B5EF4-FFF2-40B4-BE49-F238E27FC236}">
+                  <a16:creationId xmlns:a16="http://schemas.microsoft.com/office/drawing/2014/main" id="{E550A059-725E-4192-9395-1CE412F116E8}"/>
+                </a:ext>
+              </a:extLst>
+            </p:cNvPr>
+            <p:cNvCxnSpPr>
+              <a:cxnSpLocks/>
+              <a:stCxn id="86" idx="3"/>
+            </p:cNvCxnSpPr>
+            <p:nvPr/>
+          </p:nvCxnSpPr>
+          <p:spPr>
+            <a:xfrm flipV="1">
+              <a:off x="1074750" y="3550649"/>
+              <a:ext cx="521789" cy="3703"/>
+            </a:xfrm>
+            <a:prstGeom prst="straightConnector1">
+              <a:avLst/>
+            </a:prstGeom>
+            <a:ln>
+              <a:tailEnd type="triangle"/>
+            </a:ln>
+          </p:spPr>
+          <p:style>
+            <a:lnRef idx="1">
+              <a:schemeClr val="accent1"/>
+            </a:lnRef>
+            <a:fillRef idx="0">
+              <a:schemeClr val="accent1"/>
+            </a:fillRef>
+            <a:effectRef idx="0">
+              <a:schemeClr val="accent1"/>
+            </a:effectRef>
+            <a:fontRef idx="minor">
+              <a:schemeClr val="tx1"/>
+            </a:fontRef>
+          </p:style>
+        </p:cxnSp>
+        <p:cxnSp>
+          <p:nvCxnSpPr>
+            <p:cNvPr id="93" name="Straight Arrow Connector 92">
+              <a:extLst>
+                <a:ext uri="{FF2B5EF4-FFF2-40B4-BE49-F238E27FC236}">
+                  <a16:creationId xmlns:a16="http://schemas.microsoft.com/office/drawing/2014/main" id="{1BDC8980-E275-4D1D-A70E-20272E9B32BF}"/>
+                </a:ext>
+              </a:extLst>
+            </p:cNvPr>
+            <p:cNvCxnSpPr>
+              <a:cxnSpLocks/>
+              <a:endCxn id="87" idx="1"/>
+            </p:cNvCxnSpPr>
+            <p:nvPr/>
+          </p:nvCxnSpPr>
+          <p:spPr>
+            <a:xfrm>
+              <a:off x="1603071" y="3550649"/>
+              <a:ext cx="409626" cy="3703"/>
+            </a:xfrm>
+            <a:prstGeom prst="straightConnector1">
+              <a:avLst/>
+            </a:prstGeom>
+            <a:ln>
+              <a:tailEnd type="triangle"/>
+            </a:ln>
+          </p:spPr>
+          <p:style>
+            <a:lnRef idx="1">
+              <a:schemeClr val="accent1"/>
+            </a:lnRef>
+            <a:fillRef idx="0">
+              <a:schemeClr val="accent1"/>
+            </a:fillRef>
+            <a:effectRef idx="0">
+              <a:schemeClr val="accent1"/>
+            </a:effectRef>
+            <a:fontRef idx="minor">
+              <a:schemeClr val="tx1"/>
+            </a:fontRef>
+          </p:style>
+        </p:cxnSp>
+        <p:cxnSp>
+          <p:nvCxnSpPr>
+            <p:cNvPr id="94" name="Straight Arrow Connector 93">
+              <a:extLst>
+                <a:ext uri="{FF2B5EF4-FFF2-40B4-BE49-F238E27FC236}">
+                  <a16:creationId xmlns:a16="http://schemas.microsoft.com/office/drawing/2014/main" id="{8B6A0D59-502B-42C4-B104-4187E6EECDA6}"/>
+                </a:ext>
+              </a:extLst>
+            </p:cNvPr>
+            <p:cNvCxnSpPr>
+              <a:cxnSpLocks/>
+              <a:stCxn id="87" idx="3"/>
+            </p:cNvCxnSpPr>
+            <p:nvPr/>
+          </p:nvCxnSpPr>
+          <p:spPr>
+            <a:xfrm flipV="1">
+              <a:off x="2756454" y="3550650"/>
+              <a:ext cx="457112" cy="3702"/>
+            </a:xfrm>
+            <a:prstGeom prst="straightConnector1">
+              <a:avLst/>
+            </a:prstGeom>
+            <a:ln>
+              <a:tailEnd type="triangle"/>
+            </a:ln>
+          </p:spPr>
+          <p:style>
+            <a:lnRef idx="1">
+              <a:schemeClr val="accent1"/>
+            </a:lnRef>
+            <a:fillRef idx="0">
+              <a:schemeClr val="accent1"/>
+            </a:fillRef>
+            <a:effectRef idx="0">
+              <a:schemeClr val="accent1"/>
+            </a:effectRef>
+            <a:fontRef idx="minor">
+              <a:schemeClr val="tx1"/>
+            </a:fontRef>
+          </p:style>
+        </p:cxnSp>
+        <p:cxnSp>
+          <p:nvCxnSpPr>
+            <p:cNvPr id="95" name="Straight Arrow Connector 94">
+              <a:extLst>
+                <a:ext uri="{FF2B5EF4-FFF2-40B4-BE49-F238E27FC236}">
+                  <a16:creationId xmlns:a16="http://schemas.microsoft.com/office/drawing/2014/main" id="{4A782D51-AA38-4625-B826-166C81305FA4}"/>
+                </a:ext>
+              </a:extLst>
+            </p:cNvPr>
+            <p:cNvCxnSpPr>
+              <a:cxnSpLocks/>
+              <a:endCxn id="89" idx="1"/>
+            </p:cNvCxnSpPr>
+            <p:nvPr/>
+          </p:nvCxnSpPr>
+          <p:spPr>
+            <a:xfrm>
+              <a:off x="3213566" y="3550649"/>
+              <a:ext cx="494440" cy="3703"/>
+            </a:xfrm>
+            <a:prstGeom prst="straightConnector1">
+              <a:avLst/>
+            </a:prstGeom>
+            <a:ln>
+              <a:tailEnd type="triangle"/>
+            </a:ln>
+          </p:spPr>
+          <p:style>
+            <a:lnRef idx="1">
+              <a:schemeClr val="accent1"/>
+            </a:lnRef>
+            <a:fillRef idx="0">
+              <a:schemeClr val="accent1"/>
+            </a:fillRef>
+            <a:effectRef idx="0">
+              <a:schemeClr val="accent1"/>
+            </a:effectRef>
+            <a:fontRef idx="minor">
+              <a:schemeClr val="tx1"/>
+            </a:fontRef>
+          </p:style>
+        </p:cxnSp>
+        <p:sp>
+          <p:nvSpPr>
+            <p:cNvPr id="96" name="Rectangle 95">
+              <a:extLst>
+                <a:ext uri="{FF2B5EF4-FFF2-40B4-BE49-F238E27FC236}">
+                  <a16:creationId xmlns:a16="http://schemas.microsoft.com/office/drawing/2014/main" id="{58AC30B1-F62A-4F64-BCF1-F613B630F5BF}"/>
+                </a:ext>
+              </a:extLst>
+            </p:cNvPr>
+            <p:cNvSpPr/>
+            <p:nvPr/>
+          </p:nvSpPr>
+          <p:spPr>
+            <a:xfrm>
+              <a:off x="4414544" y="2589453"/>
+              <a:ext cx="843280" cy="351892"/>
+            </a:xfrm>
+            <a:prstGeom prst="rect">
+              <a:avLst/>
+            </a:prstGeom>
+            <a:solidFill>
+              <a:schemeClr val="accent2">
+                <a:lumMod val="75000"/>
+              </a:schemeClr>
+            </a:solidFill>
+          </p:spPr>
+          <p:style>
+            <a:lnRef idx="2">
+              <a:schemeClr val="accent1">
+                <a:shade val="50000"/>
+              </a:schemeClr>
+            </a:lnRef>
+            <a:fillRef idx="1">
+              <a:schemeClr val="accent1"/>
+            </a:fillRef>
+            <a:effectRef idx="0">
+              <a:schemeClr val="accent1"/>
+            </a:effectRef>
+            <a:fontRef idx="minor">
+              <a:schemeClr val="lt1"/>
+            </a:fontRef>
+          </p:style>
+          <p:txBody>
+            <a:bodyPr rtlCol="0" anchor="ctr"/>
+            <a:lstStyle/>
+            <a:p>
+              <a:pPr algn="ctr"/>
+              <a:r>
+                <a:rPr lang="en-US" sz="1200" dirty="0"/>
+                <a:t>Useful</a:t>
+              </a:r>
+            </a:p>
+          </p:txBody>
+        </p:sp>
+        <p:cxnSp>
+          <p:nvCxnSpPr>
+            <p:cNvPr id="97" name="Straight Connector 96">
+              <a:extLst>
+                <a:ext uri="{FF2B5EF4-FFF2-40B4-BE49-F238E27FC236}">
+                  <a16:creationId xmlns:a16="http://schemas.microsoft.com/office/drawing/2014/main" id="{CE986E98-50AE-4C1F-8BB7-15B027B4C5EB}"/>
+                </a:ext>
+              </a:extLst>
+            </p:cNvPr>
+            <p:cNvCxnSpPr>
+              <a:cxnSpLocks/>
+            </p:cNvCxnSpPr>
+            <p:nvPr/>
+          </p:nvCxnSpPr>
+          <p:spPr>
+            <a:xfrm>
+              <a:off x="4836184" y="2941345"/>
+              <a:ext cx="0" cy="964256"/>
+            </a:xfrm>
+            <a:prstGeom prst="line">
+              <a:avLst/>
+            </a:prstGeom>
+            <a:ln w="19050">
+              <a:solidFill>
+                <a:schemeClr val="accent2">
+                  <a:lumMod val="75000"/>
+                </a:schemeClr>
+              </a:solidFill>
+            </a:ln>
+          </p:spPr>
+          <p:style>
+            <a:lnRef idx="1">
+              <a:schemeClr val="accent1"/>
+            </a:lnRef>
+            <a:fillRef idx="0">
+              <a:schemeClr val="accent1"/>
+            </a:fillRef>
+            <a:effectRef idx="0">
+              <a:schemeClr val="accent1"/>
+            </a:effectRef>
+            <a:fontRef idx="minor">
+              <a:schemeClr val="tx1"/>
+            </a:fontRef>
+          </p:style>
+        </p:cxnSp>
+        <p:cxnSp>
+          <p:nvCxnSpPr>
+            <p:cNvPr id="98" name="Straight Arrow Connector 97">
+              <a:extLst>
+                <a:ext uri="{FF2B5EF4-FFF2-40B4-BE49-F238E27FC236}">
+                  <a16:creationId xmlns:a16="http://schemas.microsoft.com/office/drawing/2014/main" id="{76ADB9A1-C5E9-4B96-BDB8-17895044CDCA}"/>
+                </a:ext>
+              </a:extLst>
+            </p:cNvPr>
+            <p:cNvCxnSpPr>
+              <a:cxnSpLocks/>
+            </p:cNvCxnSpPr>
+            <p:nvPr/>
+          </p:nvCxnSpPr>
+          <p:spPr>
+            <a:xfrm flipV="1">
+              <a:off x="4379072" y="3511653"/>
+              <a:ext cx="457112" cy="3702"/>
+            </a:xfrm>
+            <a:prstGeom prst="straightConnector1">
+              <a:avLst/>
+            </a:prstGeom>
+            <a:ln>
+              <a:tailEnd type="triangle"/>
+            </a:ln>
+          </p:spPr>
+          <p:style>
+            <a:lnRef idx="1">
+              <a:schemeClr val="accent1"/>
+            </a:lnRef>
+            <a:fillRef idx="0">
+              <a:schemeClr val="accent1"/>
+            </a:fillRef>
+            <a:effectRef idx="0">
+              <a:schemeClr val="accent1"/>
+            </a:effectRef>
+            <a:fontRef idx="minor">
+              <a:schemeClr val="tx1"/>
+            </a:fontRef>
+          </p:style>
+        </p:cxnSp>
+        <p:sp>
+          <p:nvSpPr>
+            <p:cNvPr id="99" name="TextBox 98">
+              <a:extLst>
+                <a:ext uri="{FF2B5EF4-FFF2-40B4-BE49-F238E27FC236}">
+                  <a16:creationId xmlns:a16="http://schemas.microsoft.com/office/drawing/2014/main" id="{298D2E19-5583-4329-A6F7-2C936D3F8984}"/>
+                </a:ext>
+              </a:extLst>
+            </p:cNvPr>
+            <p:cNvSpPr txBox="1"/>
+            <p:nvPr/>
+          </p:nvSpPr>
+          <p:spPr>
+            <a:xfrm>
+              <a:off x="787466" y="3887293"/>
+              <a:ext cx="1605064" cy="261610"/>
+            </a:xfrm>
+            <a:prstGeom prst="rect">
+              <a:avLst/>
+            </a:prstGeom>
+            <a:noFill/>
+          </p:spPr>
+          <p:txBody>
+            <a:bodyPr wrap="square" rtlCol="0">
+              <a:spAutoFit/>
+            </a:bodyPr>
+            <a:lstStyle/>
+            <a:p>
+              <a:pPr algn="ctr"/>
+              <a:r>
+                <a:rPr lang="en-US" sz="1100" i="1" dirty="0"/>
+                <a:t>electricity</a:t>
+              </a:r>
+            </a:p>
+          </p:txBody>
+        </p:sp>
+        <p:sp>
+          <p:nvSpPr>
+            <p:cNvPr id="100" name="TextBox 99">
+              <a:extLst>
+                <a:ext uri="{FF2B5EF4-FFF2-40B4-BE49-F238E27FC236}">
+                  <a16:creationId xmlns:a16="http://schemas.microsoft.com/office/drawing/2014/main" id="{C1E692C0-C909-49F8-9716-BBC6EEE7EFA9}"/>
+                </a:ext>
+              </a:extLst>
+            </p:cNvPr>
+            <p:cNvSpPr txBox="1"/>
+            <p:nvPr/>
+          </p:nvSpPr>
+          <p:spPr>
+            <a:xfrm>
+              <a:off x="2417346" y="3884157"/>
+              <a:ext cx="1605064" cy="261610"/>
+            </a:xfrm>
+            <a:prstGeom prst="rect">
+              <a:avLst/>
+            </a:prstGeom>
+            <a:noFill/>
+          </p:spPr>
+          <p:txBody>
+            <a:bodyPr wrap="square" rtlCol="0">
+              <a:spAutoFit/>
+            </a:bodyPr>
+            <a:lstStyle/>
+            <a:p>
+              <a:pPr algn="ctr"/>
+              <a:r>
+                <a:rPr lang="en-US" sz="1100" i="1" dirty="0"/>
+                <a:t>electricity</a:t>
+              </a:r>
+            </a:p>
+          </p:txBody>
+        </p:sp>
+        <p:sp>
+          <p:nvSpPr>
+            <p:cNvPr id="101" name="TextBox 100">
+              <a:extLst>
+                <a:ext uri="{FF2B5EF4-FFF2-40B4-BE49-F238E27FC236}">
+                  <a16:creationId xmlns:a16="http://schemas.microsoft.com/office/drawing/2014/main" id="{662F96D5-2ADB-4E20-A8A4-5FD4CB915110}"/>
+                </a:ext>
+              </a:extLst>
+            </p:cNvPr>
+            <p:cNvSpPr txBox="1"/>
+            <p:nvPr/>
+          </p:nvSpPr>
+          <p:spPr>
+            <a:xfrm>
+              <a:off x="4037793" y="3850617"/>
+              <a:ext cx="1605064" cy="261610"/>
+            </a:xfrm>
+            <a:prstGeom prst="rect">
+              <a:avLst/>
+            </a:prstGeom>
+            <a:noFill/>
+          </p:spPr>
+          <p:txBody>
+            <a:bodyPr wrap="square" rtlCol="0">
+              <a:spAutoFit/>
+            </a:bodyPr>
+            <a:lstStyle/>
+            <a:p>
+              <a:pPr algn="ctr"/>
+              <a:r>
+                <a:rPr lang="en-US" sz="1100" i="1" dirty="0"/>
+                <a:t>light</a:t>
+              </a:r>
+            </a:p>
+          </p:txBody>
+        </p:sp>
+      </p:grpSp>
+      <p:sp>
+        <p:nvSpPr>
+          <p:cNvPr id="106" name="TextBox 105">
+            <a:extLst>
+              <a:ext uri="{FF2B5EF4-FFF2-40B4-BE49-F238E27FC236}">
+                <a16:creationId xmlns:a16="http://schemas.microsoft.com/office/drawing/2014/main" id="{B029A360-BA0B-41DC-B159-99C10E788764}"/>
+              </a:ext>
+            </a:extLst>
+          </p:cNvPr>
+          <p:cNvSpPr txBox="1"/>
+          <p:nvPr/>
+        </p:nvSpPr>
+        <p:spPr>
+          <a:xfrm>
+            <a:off x="6165921" y="252919"/>
+            <a:ext cx="5769671" cy="369332"/>
+          </a:xfrm>
+          <a:prstGeom prst="rect">
+            <a:avLst/>
+          </a:prstGeom>
+          <a:noFill/>
+        </p:spPr>
+        <p:txBody>
+          <a:bodyPr wrap="square" rtlCol="0">
+            <a:spAutoFit/>
+          </a:bodyPr>
+          <a:lstStyle/>
+          <a:p>
+            <a:pPr algn="ctr"/>
+            <a:r>
+              <a:rPr lang="en-US" i="1" dirty="0">
+                <a:solidFill>
+                  <a:schemeClr val="bg1"/>
+                </a:solidFill>
+              </a:rPr>
+              <a:t>Example of workflow using excel input files.</a:t>
+            </a:r>
+          </a:p>
+        </p:txBody>
+      </p:sp>
+      <p:sp>
+        <p:nvSpPr>
           <p:cNvPr id="111" name="Arrow: Down 110">
             <a:extLst>
               <a:ext uri="{FF2B5EF4-FFF2-40B4-BE49-F238E27FC236}">
@@ -9149,7 +11819,7 @@
     </p:spTree>
     <p:extLst>
       <p:ext uri="{BB962C8B-B14F-4D97-AF65-F5344CB8AC3E}">
-        <p14:creationId xmlns:p14="http://schemas.microsoft.com/office/powerpoint/2010/main" val="2825312319"/>
+        <p14:creationId xmlns:p14="http://schemas.microsoft.com/office/powerpoint/2010/main" val="1895124595"/>
       </p:ext>
     </p:extLst>
   </p:cSld>
@@ -10340,21 +13010,6 @@
 </file>
 
 <file path=customXml/item1.xml><?xml version="1.0" encoding="utf-8"?>
-<p:properties xmlns:p="http://schemas.microsoft.com/office/2006/metadata/properties" xmlns:xsi="http://www.w3.org/2001/XMLSchema-instance" xmlns:pc="http://schemas.microsoft.com/office/infopath/2007/PartnerControls">
-  <documentManagement/>
-</p:properties>
-</file>
-
-<file path=customXml/item2.xml><?xml version="1.0" encoding="utf-8"?>
-<?mso-contentType ?>
-<FormTemplates xmlns="http://schemas.microsoft.com/sharepoint/v3/contenttype/forms">
-  <Display>DocumentLibraryForm</Display>
-  <Edit>DocumentLibraryForm</Edit>
-  <New>DocumentLibraryForm</New>
-</FormTemplates>
-</file>
-
-<file path=customXml/item3.xml><?xml version="1.0" encoding="utf-8"?>
 <ct:contentTypeSchema xmlns:ct="http://schemas.microsoft.com/office/2006/metadata/contentType" xmlns:ma="http://schemas.microsoft.com/office/2006/metadata/properties/metaAttributes" ct:_="" ma:_="" ma:contentTypeName="Document" ma:contentTypeID="0x0101006C6C0CC2C1BBF24EAF6B3D15882DAE61" ma:contentTypeVersion="9" ma:contentTypeDescription="Create a new document." ma:contentTypeScope="" ma:versionID="d7d442aded1f32970ca7b5881ad565e0">
   <xsd:schema xmlns:xsd="http://www.w3.org/2001/XMLSchema" xmlns:xs="http://www.w3.org/2001/XMLSchema" xmlns:p="http://schemas.microsoft.com/office/2006/metadata/properties" xmlns:ns2="767a3297-cb3c-49cb-bb81-4accf9a9be2f" xmlns:ns3="4338dd45-1272-44e4-8715-b442259e15fd" targetNamespace="http://schemas.microsoft.com/office/2006/metadata/properties" ma:root="true" ma:fieldsID="efdb64e9efef0c44a9d2235c675f250d" ns2:_="" ns3:_="">
     <xsd:import namespace="767a3297-cb3c-49cb-bb81-4accf9a9be2f"/>
@@ -10553,32 +13208,22 @@
 </ct:contentTypeSchema>
 </file>
 
-<file path=customXml/itemProps1.xml><?xml version="1.0" encoding="utf-8"?>
-<ds:datastoreItem xmlns:ds="http://schemas.openxmlformats.org/officeDocument/2006/customXml" ds:itemID="{5AD93C57-A7ED-44E6-88BF-DA3984EE19E6}">
-  <ds:schemaRefs>
-    <ds:schemaRef ds:uri="4338dd45-1272-44e4-8715-b442259e15fd"/>
-    <ds:schemaRef ds:uri="http://schemas.microsoft.com/office/2006/documentManagement/types"/>
-    <ds:schemaRef ds:uri="http://purl.org/dc/elements/1.1/"/>
-    <ds:schemaRef ds:uri="http://schemas.microsoft.com/office/2006/metadata/properties"/>
-    <ds:schemaRef ds:uri="http://schemas.openxmlformats.org/package/2006/metadata/core-properties"/>
-    <ds:schemaRef ds:uri="http://schemas.microsoft.com/office/infopath/2007/PartnerControls"/>
-    <ds:schemaRef ds:uri="http://purl.org/dc/terms/"/>
-    <ds:schemaRef ds:uri="767a3297-cb3c-49cb-bb81-4accf9a9be2f"/>
-    <ds:schemaRef ds:uri="http://www.w3.org/XML/1998/namespace"/>
-    <ds:schemaRef ds:uri="http://purl.org/dc/dcmitype/"/>
-  </ds:schemaRefs>
-</ds:datastoreItem>
+<file path=customXml/item2.xml><?xml version="1.0" encoding="utf-8"?>
+<?mso-contentType ?>
+<FormTemplates xmlns="http://schemas.microsoft.com/sharepoint/v3/contenttype/forms">
+  <Display>DocumentLibraryForm</Display>
+  <Edit>DocumentLibraryForm</Edit>
+  <New>DocumentLibraryForm</New>
+</FormTemplates>
 </file>
 
-<file path=customXml/itemProps2.xml><?xml version="1.0" encoding="utf-8"?>
-<ds:datastoreItem xmlns:ds="http://schemas.openxmlformats.org/officeDocument/2006/customXml" ds:itemID="{6E794EA7-8E28-4624-885F-9EF05194D2E6}">
-  <ds:schemaRefs>
-    <ds:schemaRef ds:uri="http://schemas.microsoft.com/sharepoint/v3/contenttype/forms"/>
-  </ds:schemaRefs>
-</ds:datastoreItem>
+<file path=customXml/item3.xml><?xml version="1.0" encoding="utf-8"?>
+<p:properties xmlns:p="http://schemas.microsoft.com/office/2006/metadata/properties" xmlns:xsi="http://www.w3.org/2001/XMLSchema-instance" xmlns:pc="http://schemas.microsoft.com/office/infopath/2007/PartnerControls">
+  <documentManagement/>
+</p:properties>
 </file>
 
-<file path=customXml/itemProps3.xml><?xml version="1.0" encoding="utf-8"?>
+<file path=customXml/itemProps1.xml><?xml version="1.0" encoding="utf-8"?>
 <ds:datastoreItem xmlns:ds="http://schemas.openxmlformats.org/officeDocument/2006/customXml" ds:itemID="{9CDBFC3E-F1C5-4547-9A66-15BCDB336D7F}">
   <ds:schemaRefs>
     <ds:schemaRef ds:uri="4338dd45-1272-44e4-8715-b442259e15fd"/>
@@ -10595,4 +13240,29 @@
     <ds:schemaRef ds:uri="http://www.w3.org/2001/XMLSchema"/>
   </ds:schemaRefs>
 </ds:datastoreItem>
+</file>
+
+<file path=customXml/itemProps2.xml><?xml version="1.0" encoding="utf-8"?>
+<ds:datastoreItem xmlns:ds="http://schemas.openxmlformats.org/officeDocument/2006/customXml" ds:itemID="{6E794EA7-8E28-4624-885F-9EF05194D2E6}">
+  <ds:schemaRefs>
+    <ds:schemaRef ds:uri="http://schemas.microsoft.com/sharepoint/v3/contenttype/forms"/>
+  </ds:schemaRefs>
+</ds:datastoreItem>
+</file>
+
+<file path=customXml/itemProps3.xml><?xml version="1.0" encoding="utf-8"?>
+<ds:datastoreItem xmlns:ds="http://schemas.openxmlformats.org/officeDocument/2006/customXml" ds:itemID="{5AD93C57-A7ED-44E6-88BF-DA3984EE19E6}">
+  <ds:schemaRefs>
+    <ds:schemaRef ds:uri="http://purl.org/dc/dcmitype/"/>
+    <ds:schemaRef ds:uri="http://schemas.microsoft.com/office/infopath/2007/PartnerControls"/>
+    <ds:schemaRef ds:uri="http://schemas.microsoft.com/office/2006/documentManagement/types"/>
+    <ds:schemaRef ds:uri="http://purl.org/dc/elements/1.1/"/>
+    <ds:schemaRef ds:uri="http://schemas.microsoft.com/office/2006/metadata/properties"/>
+    <ds:schemaRef ds:uri="http://purl.org/dc/terms/"/>
+    <ds:schemaRef ds:uri="http://schemas.openxmlformats.org/package/2006/metadata/core-properties"/>
+    <ds:schemaRef ds:uri="4338dd45-1272-44e4-8715-b442259e15fd"/>
+    <ds:schemaRef ds:uri="767a3297-cb3c-49cb-bb81-4accf9a9be2f"/>
+    <ds:schemaRef ds:uri="http://www.w3.org/XML/1998/namespace"/>
+  </ds:schemaRefs>
+</ds:datastoreItem>
 </file>
</xml_diff>

<commit_message>
Updated xlsx tutorial descriptions and figures
</commit_message>
<xml_diff>
--- a/tutorial/westeros/_static/westeroes_baseline_xlsx_workflow.pptx
+++ b/tutorial/westeros/_static/westeroes_baseline_xlsx_workflow.pptx
@@ -366,7 +366,7 @@
           <a:p>
             <a:fld id="{1EAC332E-8893-FE4E-9A25-93BB30EFA0DA}" type="datetimeFigureOut">
               <a:rPr lang="en-US" smtClean="0"/>
-              <a:t>4/21/2021</a:t>
+              <a:t>5/5/2021</a:t>
             </a:fld>
             <a:endParaRPr lang="en-US"/>
           </a:p>
@@ -2445,7 +2445,7 @@
           <a:p>
             <a:fld id="{6CCCF253-1AAC-4E48-AEC6-9F6937C7D46B}" type="datetime4">
               <a:rPr lang="LID4096" noProof="0" smtClean="0"/>
-              <a:t>21 April 2021</a:t>
+              <a:t>05 May 2021</a:t>
             </a:fld>
             <a:endParaRPr lang="en-GB" noProof="0"/>
           </a:p>
@@ -2834,7 +2834,7 @@
           <a:p>
             <a:fld id="{D70C37C2-A143-402B-877C-849CBEEFD25A}" type="datetime4">
               <a:rPr lang="LID4096" smtClean="0"/>
-              <a:t>21 April 2021</a:t>
+              <a:t>05 May 2021</a:t>
             </a:fld>
             <a:endParaRPr lang="en-GB"/>
           </a:p>
@@ -3305,7 +3305,7 @@
           <a:p>
             <a:fld id="{544AD98C-C026-43BB-AEEE-3945BA0F5F8C}" type="datetime4">
               <a:rPr lang="LID4096" noProof="0" smtClean="0"/>
-              <a:t>21 April 2021</a:t>
+              <a:t>05 May 2021</a:t>
             </a:fld>
             <a:endParaRPr lang="en-GB" noProof="0"/>
           </a:p>
@@ -3656,7 +3656,7 @@
           <a:p>
             <a:fld id="{E782D6B4-2390-4BCC-B671-8CF648CB235D}" type="datetime4">
               <a:rPr lang="LID4096" noProof="0" smtClean="0"/>
-              <a:t>21 April 2021</a:t>
+              <a:t>05 May 2021</a:t>
             </a:fld>
             <a:endParaRPr lang="en-GB" noProof="0"/>
           </a:p>
@@ -4116,7 +4116,7 @@
           <a:p>
             <a:fld id="{23412D64-AA80-4167-B477-6ED1D7FC4795}" type="datetime4">
               <a:rPr lang="LID4096" smtClean="0"/>
-              <a:t>21 April 2021</a:t>
+              <a:t>05 May 2021</a:t>
             </a:fld>
             <a:endParaRPr lang="en-GB"/>
           </a:p>
@@ -4537,7 +4537,7 @@
           <a:p>
             <a:fld id="{CA025497-7E11-4525-9692-4120F835BBD2}" type="datetime4">
               <a:rPr lang="LID4096" smtClean="0"/>
-              <a:t>21 April 2021</a:t>
+              <a:t>05 May 2021</a:t>
             </a:fld>
             <a:endParaRPr lang="en-GB"/>
           </a:p>
@@ -5162,7 +5162,7 @@
           <a:p>
             <a:fld id="{29920D7F-2E71-4F3D-9F44-90C68F6B8EA4}" type="datetime4">
               <a:rPr lang="LID4096" smtClean="0"/>
-              <a:t>21 April 2021</a:t>
+              <a:t>05 May 2021</a:t>
             </a:fld>
             <a:endParaRPr lang="en-GB"/>
           </a:p>
@@ -10785,7 +10785,7 @@
             </a:r>
             <a:r>
               <a:rPr lang="en-US" sz="1400" i="1" dirty="0"/>
-              <a:t>n</a:t>
+              <a:t>constraints</a:t>
             </a:r>
             <a:r>
               <a:rPr lang="en-US" sz="1400" dirty="0"/>
@@ -11017,7 +11017,7 @@
             <a:pPr algn="ctr"/>
             <a:r>
               <a:rPr lang="en-US" sz="1400" dirty="0"/>
-              <a:t>data set “b” in .xlsx format</a:t>
+              <a:t>data set “demand” in .xlsx format</a:t>
             </a:r>
           </a:p>
         </p:txBody>
@@ -11245,11 +11245,55 @@
             <a:pPr algn="ctr"/>
             <a:r>
               <a:rPr lang="en-US" sz="1400" dirty="0"/>
-              <a:t>data set “a” .xlsx format</a:t>
+              <a:t>data set “technologies” in .xlsx format</a:t>
             </a:r>
           </a:p>
         </p:txBody>
       </p:sp>
+      <p:cxnSp>
+        <p:nvCxnSpPr>
+          <p:cNvPr id="3" name="Straight Connector 2">
+            <a:extLst>
+              <a:ext uri="{FF2B5EF4-FFF2-40B4-BE49-F238E27FC236}">
+                <a16:creationId xmlns:a16="http://schemas.microsoft.com/office/drawing/2014/main" id="{343AD468-6D1F-4B38-B7DB-899F75F59449}"/>
+              </a:ext>
+            </a:extLst>
+          </p:cNvPr>
+          <p:cNvCxnSpPr>
+            <a:cxnSpLocks/>
+          </p:cNvCxnSpPr>
+          <p:nvPr/>
+        </p:nvCxnSpPr>
+        <p:spPr>
+          <a:xfrm>
+            <a:off x="6165921" y="2393004"/>
+            <a:ext cx="5867194" cy="0"/>
+          </a:xfrm>
+          <a:prstGeom prst="line">
+            <a:avLst/>
+          </a:prstGeom>
+          <a:ln w="44450">
+            <a:solidFill>
+              <a:srgbClr val="FF0000"/>
+            </a:solidFill>
+            <a:prstDash val="dash"/>
+          </a:ln>
+        </p:spPr>
+        <p:style>
+          <a:lnRef idx="1">
+            <a:schemeClr val="accent1"/>
+          </a:lnRef>
+          <a:fillRef idx="0">
+            <a:schemeClr val="accent1"/>
+          </a:fillRef>
+          <a:effectRef idx="0">
+            <a:schemeClr val="accent1"/>
+          </a:effectRef>
+          <a:fontRef idx="minor">
+            <a:schemeClr val="tx1"/>
+          </a:fontRef>
+        </p:style>
+      </p:cxnSp>
       <p:sp>
         <p:nvSpPr>
           <p:cNvPr id="128" name="Arrow: Down 127">
@@ -13010,6 +13054,15 @@
 </file>
 
 <file path=customXml/item1.xml><?xml version="1.0" encoding="utf-8"?>
+<?mso-contentType ?>
+<FormTemplates xmlns="http://schemas.microsoft.com/sharepoint/v3/contenttype/forms">
+  <Display>DocumentLibraryForm</Display>
+  <Edit>DocumentLibraryForm</Edit>
+  <New>DocumentLibraryForm</New>
+</FormTemplates>
+</file>
+
+<file path=customXml/item2.xml><?xml version="1.0" encoding="utf-8"?>
 <ct:contentTypeSchema xmlns:ct="http://schemas.microsoft.com/office/2006/metadata/contentType" xmlns:ma="http://schemas.microsoft.com/office/2006/metadata/properties/metaAttributes" ct:_="" ma:_="" ma:contentTypeName="Document" ma:contentTypeID="0x0101006C6C0CC2C1BBF24EAF6B3D15882DAE61" ma:contentTypeVersion="9" ma:contentTypeDescription="Create a new document." ma:contentTypeScope="" ma:versionID="d7d442aded1f32970ca7b5881ad565e0">
   <xsd:schema xmlns:xsd="http://www.w3.org/2001/XMLSchema" xmlns:xs="http://www.w3.org/2001/XMLSchema" xmlns:p="http://schemas.microsoft.com/office/2006/metadata/properties" xmlns:ns2="767a3297-cb3c-49cb-bb81-4accf9a9be2f" xmlns:ns3="4338dd45-1272-44e4-8715-b442259e15fd" targetNamespace="http://schemas.microsoft.com/office/2006/metadata/properties" ma:root="true" ma:fieldsID="efdb64e9efef0c44a9d2235c675f250d" ns2:_="" ns3:_="">
     <xsd:import namespace="767a3297-cb3c-49cb-bb81-4accf9a9be2f"/>
@@ -13208,15 +13261,6 @@
 </ct:contentTypeSchema>
 </file>
 
-<file path=customXml/item2.xml><?xml version="1.0" encoding="utf-8"?>
-<?mso-contentType ?>
-<FormTemplates xmlns="http://schemas.microsoft.com/sharepoint/v3/contenttype/forms">
-  <Display>DocumentLibraryForm</Display>
-  <Edit>DocumentLibraryForm</Edit>
-  <New>DocumentLibraryForm</New>
-</FormTemplates>
-</file>
-
 <file path=customXml/item3.xml><?xml version="1.0" encoding="utf-8"?>
 <p:properties xmlns:p="http://schemas.microsoft.com/office/2006/metadata/properties" xmlns:xsi="http://www.w3.org/2001/XMLSchema-instance" xmlns:pc="http://schemas.microsoft.com/office/infopath/2007/PartnerControls">
   <documentManagement/>
@@ -13224,6 +13268,14 @@
 </file>
 
 <file path=customXml/itemProps1.xml><?xml version="1.0" encoding="utf-8"?>
+<ds:datastoreItem xmlns:ds="http://schemas.openxmlformats.org/officeDocument/2006/customXml" ds:itemID="{6E794EA7-8E28-4624-885F-9EF05194D2E6}">
+  <ds:schemaRefs>
+    <ds:schemaRef ds:uri="http://schemas.microsoft.com/sharepoint/v3/contenttype/forms"/>
+  </ds:schemaRefs>
+</ds:datastoreItem>
+</file>
+
+<file path=customXml/itemProps2.xml><?xml version="1.0" encoding="utf-8"?>
 <ds:datastoreItem xmlns:ds="http://schemas.openxmlformats.org/officeDocument/2006/customXml" ds:itemID="{9CDBFC3E-F1C5-4547-9A66-15BCDB336D7F}">
   <ds:schemaRefs>
     <ds:schemaRef ds:uri="4338dd45-1272-44e4-8715-b442259e15fd"/>
@@ -13238,14 +13290,6 @@
     <ds:schemaRef ds:uri="http://schemas.microsoft.com/office/infopath/2007/PartnerControls"/>
     <ds:schemaRef ds:uri="http://schemas.openxmlformats.org/package/2006/metadata/core-properties"/>
     <ds:schemaRef ds:uri="http://www.w3.org/2001/XMLSchema"/>
-  </ds:schemaRefs>
-</ds:datastoreItem>
-</file>
-
-<file path=customXml/itemProps2.xml><?xml version="1.0" encoding="utf-8"?>
-<ds:datastoreItem xmlns:ds="http://schemas.openxmlformats.org/officeDocument/2006/customXml" ds:itemID="{6E794EA7-8E28-4624-885F-9EF05194D2E6}">
-  <ds:schemaRefs>
-    <ds:schemaRef ds:uri="http://schemas.microsoft.com/sharepoint/v3/contenttype/forms"/>
   </ds:schemaRefs>
 </ds:datastoreItem>
 </file>

</xml_diff>